<commit_message>
update and finished Datetime kapitel
</commit_message>
<xml_diff>
--- a/Materialien/Powerpoint/Einfuehrung in Datetime.pptx
+++ b/Materialien/Powerpoint/Einfuehrung in Datetime.pptx
@@ -5,15 +5,20 @@
     <p:sldMasterId id="2147483660" r:id="rId1"/>
   </p:sldMasterIdLst>
   <p:notesMasterIdLst>
-    <p:notesMasterId r:id="rId8"/>
+    <p:notesMasterId r:id="rId13"/>
   </p:notesMasterIdLst>
   <p:sldIdLst>
     <p:sldId id="256" r:id="rId2"/>
     <p:sldId id="258" r:id="rId3"/>
     <p:sldId id="260" r:id="rId4"/>
     <p:sldId id="263" r:id="rId5"/>
-    <p:sldId id="261" r:id="rId6"/>
-    <p:sldId id="262" r:id="rId7"/>
+    <p:sldId id="264" r:id="rId6"/>
+    <p:sldId id="266" r:id="rId7"/>
+    <p:sldId id="265" r:id="rId8"/>
+    <p:sldId id="261" r:id="rId9"/>
+    <p:sldId id="262" r:id="rId10"/>
+    <p:sldId id="267" r:id="rId11"/>
+    <p:sldId id="268" r:id="rId12"/>
   </p:sldIdLst>
   <p:sldSz cx="12192000" cy="6858000"/>
   <p:notesSz cx="6858000" cy="9144000"/>
@@ -456,7 +461,7 @@
           <a:p>
             <a:fld id="{6584E7B2-9624-D04F-9833-6D05D714EB80}" type="datetimeFigureOut">
               <a:rPr lang="de-DE" smtClean="0"/>
-              <a:t>29.07.21</a:t>
+              <a:t>18.01.2022</a:t>
             </a:fld>
             <a:endParaRPr lang="de-DE"/>
           </a:p>
@@ -919,7 +924,7 @@
           <a:p>
             <a:fld id="{D4AD37E9-5A10-49A7-855D-CAA2D2E848B6}" type="datetimeFigureOut">
               <a:rPr lang="de-DE" smtClean="0"/>
-              <a:t>29.07.21</a:t>
+              <a:t>18.01.2022</a:t>
             </a:fld>
             <a:endParaRPr lang="de-DE"/>
           </a:p>
@@ -1200,7 +1205,7 @@
           <a:p>
             <a:fld id="{D4AD37E9-5A10-49A7-855D-CAA2D2E848B6}" type="datetimeFigureOut">
               <a:rPr lang="de-DE" smtClean="0"/>
-              <a:t>29.07.21</a:t>
+              <a:t>18.01.2022</a:t>
             </a:fld>
             <a:endParaRPr lang="de-DE"/>
           </a:p>
@@ -1392,7 +1397,7 @@
           <a:p>
             <a:fld id="{D4AD37E9-5A10-49A7-855D-CAA2D2E848B6}" type="datetimeFigureOut">
               <a:rPr lang="de-DE" smtClean="0"/>
-              <a:t>29.07.21</a:t>
+              <a:t>18.01.2022</a:t>
             </a:fld>
             <a:endParaRPr lang="de-DE"/>
           </a:p>
@@ -1653,7 +1658,7 @@
           <a:p>
             <a:fld id="{D4AD37E9-5A10-49A7-855D-CAA2D2E848B6}" type="datetimeFigureOut">
               <a:rPr lang="de-DE" smtClean="0"/>
-              <a:t>29.07.21</a:t>
+              <a:t>18.01.2022</a:t>
             </a:fld>
             <a:endParaRPr lang="de-DE"/>
           </a:p>
@@ -2079,7 +2084,7 @@
           <a:p>
             <a:fld id="{D4AD37E9-5A10-49A7-855D-CAA2D2E848B6}" type="datetimeFigureOut">
               <a:rPr lang="de-DE" smtClean="0"/>
-              <a:t>29.07.21</a:t>
+              <a:t>18.01.2022</a:t>
             </a:fld>
             <a:endParaRPr lang="de-DE"/>
           </a:p>
@@ -2625,7 +2630,7 @@
           <a:p>
             <a:fld id="{D4AD37E9-5A10-49A7-855D-CAA2D2E848B6}" type="datetimeFigureOut">
               <a:rPr lang="de-DE" smtClean="0"/>
-              <a:t>29.07.21</a:t>
+              <a:t>18.01.2022</a:t>
             </a:fld>
             <a:endParaRPr lang="de-DE"/>
           </a:p>
@@ -3456,7 +3461,7 @@
           <a:p>
             <a:fld id="{D4AD37E9-5A10-49A7-855D-CAA2D2E848B6}" type="datetimeFigureOut">
               <a:rPr lang="de-DE" smtClean="0"/>
-              <a:t>29.07.21</a:t>
+              <a:t>18.01.2022</a:t>
             </a:fld>
             <a:endParaRPr lang="de-DE"/>
           </a:p>
@@ -3626,7 +3631,7 @@
           <a:p>
             <a:fld id="{D4AD37E9-5A10-49A7-855D-CAA2D2E848B6}" type="datetimeFigureOut">
               <a:rPr lang="de-DE" smtClean="0"/>
-              <a:t>29.07.21</a:t>
+              <a:t>18.01.2022</a:t>
             </a:fld>
             <a:endParaRPr lang="de-DE"/>
           </a:p>
@@ -3806,7 +3811,7 @@
           <a:p>
             <a:fld id="{D4AD37E9-5A10-49A7-855D-CAA2D2E848B6}" type="datetimeFigureOut">
               <a:rPr lang="de-DE" smtClean="0"/>
-              <a:t>29.07.21</a:t>
+              <a:t>18.01.2022</a:t>
             </a:fld>
             <a:endParaRPr lang="de-DE"/>
           </a:p>
@@ -3976,7 +3981,7 @@
           <a:p>
             <a:fld id="{D4AD37E9-5A10-49A7-855D-CAA2D2E848B6}" type="datetimeFigureOut">
               <a:rPr lang="de-DE" smtClean="0"/>
-              <a:t>29.07.21</a:t>
+              <a:t>18.01.2022</a:t>
             </a:fld>
             <a:endParaRPr lang="de-DE"/>
           </a:p>
@@ -4233,7 +4238,7 @@
           <a:p>
             <a:fld id="{D4AD37E9-5A10-49A7-855D-CAA2D2E848B6}" type="datetimeFigureOut">
               <a:rPr lang="de-DE" smtClean="0"/>
-              <a:t>29.07.21</a:t>
+              <a:t>18.01.2022</a:t>
             </a:fld>
             <a:endParaRPr lang="de-DE"/>
           </a:p>
@@ -4465,7 +4470,7 @@
           <a:p>
             <a:fld id="{D4AD37E9-5A10-49A7-855D-CAA2D2E848B6}" type="datetimeFigureOut">
               <a:rPr lang="de-DE" smtClean="0"/>
-              <a:t>29.07.21</a:t>
+              <a:t>18.01.2022</a:t>
             </a:fld>
             <a:endParaRPr lang="de-DE"/>
           </a:p>
@@ -4858,7 +4863,7 @@
           <a:p>
             <a:fld id="{D4AD37E9-5A10-49A7-855D-CAA2D2E848B6}" type="datetimeFigureOut">
               <a:rPr lang="de-DE" smtClean="0"/>
-              <a:t>29.07.21</a:t>
+              <a:t>18.01.2022</a:t>
             </a:fld>
             <a:endParaRPr lang="de-DE"/>
           </a:p>
@@ -4976,7 +4981,7 @@
           <a:p>
             <a:fld id="{D4AD37E9-5A10-49A7-855D-CAA2D2E848B6}" type="datetimeFigureOut">
               <a:rPr lang="de-DE" smtClean="0"/>
-              <a:t>29.07.21</a:t>
+              <a:t>18.01.2022</a:t>
             </a:fld>
             <a:endParaRPr lang="de-DE"/>
           </a:p>
@@ -5071,7 +5076,7 @@
           <a:p>
             <a:fld id="{D4AD37E9-5A10-49A7-855D-CAA2D2E848B6}" type="datetimeFigureOut">
               <a:rPr lang="de-DE" smtClean="0"/>
-              <a:t>29.07.21</a:t>
+              <a:t>18.01.2022</a:t>
             </a:fld>
             <a:endParaRPr lang="de-DE"/>
           </a:p>
@@ -5344,7 +5349,7 @@
           <a:p>
             <a:fld id="{D4AD37E9-5A10-49A7-855D-CAA2D2E848B6}" type="datetimeFigureOut">
               <a:rPr lang="de-DE" smtClean="0"/>
-              <a:t>29.07.21</a:t>
+              <a:t>18.01.2022</a:t>
             </a:fld>
             <a:endParaRPr lang="de-DE"/>
           </a:p>
@@ -5625,7 +5630,7 @@
           <a:p>
             <a:fld id="{D4AD37E9-5A10-49A7-855D-CAA2D2E848B6}" type="datetimeFigureOut">
               <a:rPr lang="de-DE" smtClean="0"/>
-              <a:t>29.07.21</a:t>
+              <a:t>18.01.2022</a:t>
             </a:fld>
             <a:endParaRPr lang="de-DE"/>
           </a:p>
@@ -5865,7 +5870,7 @@
           <a:p>
             <a:fld id="{D4AD37E9-5A10-49A7-855D-CAA2D2E848B6}" type="datetimeFigureOut">
               <a:rPr lang="de-DE" smtClean="0"/>
-              <a:t>29.07.21</a:t>
+              <a:t>18.01.2022</a:t>
             </a:fld>
             <a:endParaRPr lang="de-DE"/>
           </a:p>
@@ -6551,7 +6556,7 @@
           <a:p>
             <a:fld id="{D4AD37E9-5A10-49A7-855D-CAA2D2E848B6}" type="datetimeFigureOut">
               <a:rPr lang="de-DE" smtClean="0"/>
-              <a:t>29.07.21</a:t>
+              <a:t>18.01.2022</a:t>
             </a:fld>
             <a:endParaRPr lang="de-DE"/>
           </a:p>
@@ -6743,6 +6748,976 @@
 </p:sld>
 </file>
 
+<file path=ppt/slides/slide10.xml><?xml version="1.0" encoding="utf-8"?>
+<p:sld xmlns:a="http://schemas.openxmlformats.org/drawingml/2006/main" xmlns:r="http://schemas.openxmlformats.org/officeDocument/2006/relationships" xmlns:p="http://schemas.openxmlformats.org/presentationml/2006/main">
+  <p:cSld>
+    <p:spTree>
+      <p:nvGrpSpPr>
+        <p:cNvPr id="1" name=""/>
+        <p:cNvGrpSpPr/>
+        <p:nvPr/>
+      </p:nvGrpSpPr>
+      <p:grpSpPr>
+        <a:xfrm>
+          <a:off x="0" y="0"/>
+          <a:ext cx="0" cy="0"/>
+          <a:chOff x="0" y="0"/>
+          <a:chExt cx="0" cy="0"/>
+        </a:xfrm>
+      </p:grpSpPr>
+      <p:sp>
+        <p:nvSpPr>
+          <p:cNvPr id="5" name="Titel 4">
+            <a:extLst>
+              <a:ext uri="{FF2B5EF4-FFF2-40B4-BE49-F238E27FC236}">
+                <a16:creationId xmlns:a16="http://schemas.microsoft.com/office/drawing/2014/main" id="{BDF2C912-E02F-4E1F-82DF-351A88BA5B31}"/>
+              </a:ext>
+            </a:extLst>
+          </p:cNvPr>
+          <p:cNvSpPr>
+            <a:spLocks noGrp="1"/>
+          </p:cNvSpPr>
+          <p:nvPr>
+            <p:ph type="title"/>
+          </p:nvPr>
+        </p:nvSpPr>
+        <p:spPr>
+          <a:xfrm>
+            <a:off x="838200" y="365125"/>
+            <a:ext cx="7958667" cy="1137104"/>
+          </a:xfrm>
+        </p:spPr>
+        <p:txBody>
+          <a:bodyPr anchor="b">
+            <a:normAutofit/>
+          </a:bodyPr>
+          <a:lstStyle/>
+          <a:p>
+            <a:r>
+              <a:rPr lang="de-DE" sz="4400" dirty="0" err="1">
+                <a:solidFill>
+                  <a:schemeClr val="tx1">
+                    <a:lumMod val="95000"/>
+                  </a:schemeClr>
+                </a:solidFill>
+              </a:rPr>
+              <a:t>timedelta</a:t>
+            </a:r>
+            <a:endParaRPr lang="de-DE" sz="4400" dirty="0">
+              <a:solidFill>
+                <a:schemeClr val="tx1">
+                  <a:lumMod val="95000"/>
+                </a:schemeClr>
+              </a:solidFill>
+            </a:endParaRPr>
+          </a:p>
+        </p:txBody>
+      </p:sp>
+      <p:sp>
+        <p:nvSpPr>
+          <p:cNvPr id="6" name="Inhaltsplatzhalter 5">
+            <a:extLst>
+              <a:ext uri="{FF2B5EF4-FFF2-40B4-BE49-F238E27FC236}">
+                <a16:creationId xmlns:a16="http://schemas.microsoft.com/office/drawing/2014/main" id="{67FD4DD5-46C1-4974-A569-BB95F27DCC4F}"/>
+              </a:ext>
+            </a:extLst>
+          </p:cNvPr>
+          <p:cNvSpPr>
+            <a:spLocks noGrp="1"/>
+          </p:cNvSpPr>
+          <p:nvPr>
+            <p:ph idx="1"/>
+          </p:nvPr>
+        </p:nvSpPr>
+        <p:spPr>
+          <a:xfrm>
+            <a:off x="838201" y="1825625"/>
+            <a:ext cx="7958666" cy="4351338"/>
+          </a:xfrm>
+        </p:spPr>
+        <p:txBody>
+          <a:bodyPr>
+            <a:normAutofit/>
+          </a:bodyPr>
+          <a:lstStyle/>
+          <a:p>
+            <a:r>
+              <a:rPr lang="de-DE" sz="2400" dirty="0">
+                <a:solidFill>
+                  <a:schemeClr val="tx1">
+                    <a:lumMod val="95000"/>
+                  </a:schemeClr>
+                </a:solidFill>
+              </a:rPr>
+              <a:t>Die </a:t>
+            </a:r>
+            <a:r>
+              <a:rPr lang="de-DE" sz="2400" dirty="0" err="1">
+                <a:solidFill>
+                  <a:schemeClr val="tx1">
+                    <a:lumMod val="95000"/>
+                  </a:schemeClr>
+                </a:solidFill>
+              </a:rPr>
+              <a:t>timedelta</a:t>
+            </a:r>
+            <a:r>
+              <a:rPr lang="de-DE" sz="2400" dirty="0">
+                <a:solidFill>
+                  <a:schemeClr val="tx1">
+                    <a:lumMod val="95000"/>
+                  </a:schemeClr>
+                </a:solidFill>
+              </a:rPr>
+              <a:t>-Klasse wird verwendet zur Differenzbildung zwischen zwei Zeit- oder Datums-Objekten.</a:t>
+            </a:r>
+          </a:p>
+          <a:p>
+            <a:pPr lvl="1"/>
+            <a:endParaRPr lang="de-DE" sz="1600" dirty="0">
+              <a:solidFill>
+                <a:schemeClr val="tx1">
+                  <a:lumMod val="95000"/>
+                </a:schemeClr>
+              </a:solidFill>
+            </a:endParaRPr>
+          </a:p>
+          <a:p>
+            <a:pPr lvl="1"/>
+            <a:r>
+              <a:rPr lang="de-DE" sz="1600" dirty="0">
+                <a:solidFill>
+                  <a:schemeClr val="tx1">
+                    <a:lumMod val="95000"/>
+                  </a:schemeClr>
+                </a:solidFill>
+              </a:rPr>
+              <a:t>Addieren</a:t>
+            </a:r>
+          </a:p>
+          <a:p>
+            <a:pPr lvl="1"/>
+            <a:r>
+              <a:rPr lang="de-DE" sz="1600" dirty="0" err="1">
+                <a:solidFill>
+                  <a:schemeClr val="tx1">
+                    <a:lumMod val="95000"/>
+                  </a:schemeClr>
+                </a:solidFill>
+              </a:rPr>
+              <a:t>Substrahieren</a:t>
+            </a:r>
+            <a:endParaRPr lang="de-DE" sz="1600" dirty="0">
+              <a:solidFill>
+                <a:schemeClr val="tx1">
+                  <a:lumMod val="95000"/>
+                </a:schemeClr>
+              </a:solidFill>
+            </a:endParaRPr>
+          </a:p>
+          <a:p>
+            <a:pPr lvl="1"/>
+            <a:r>
+              <a:rPr lang="de-DE" sz="1600" dirty="0">
+                <a:solidFill>
+                  <a:schemeClr val="tx1">
+                    <a:lumMod val="95000"/>
+                  </a:schemeClr>
+                </a:solidFill>
+              </a:rPr>
+              <a:t>Differenzbildung</a:t>
+            </a:r>
+          </a:p>
+          <a:p>
+            <a:pPr marL="457200" lvl="1" indent="0">
+              <a:buNone/>
+            </a:pPr>
+            <a:endParaRPr lang="de-DE" sz="1600" dirty="0">
+              <a:solidFill>
+                <a:schemeClr val="tx1">
+                  <a:lumMod val="95000"/>
+                </a:schemeClr>
+              </a:solidFill>
+            </a:endParaRPr>
+          </a:p>
+        </p:txBody>
+      </p:sp>
+      <p:sp>
+        <p:nvSpPr>
+          <p:cNvPr id="7" name="Date Placeholder 3">
+            <a:extLst>
+              <a:ext uri="{FF2B5EF4-FFF2-40B4-BE49-F238E27FC236}">
+                <a16:creationId xmlns:a16="http://schemas.microsoft.com/office/drawing/2014/main" id="{18705B3C-262D-45A3-8C90-9FC26244A8CC}"/>
+              </a:ext>
+            </a:extLst>
+          </p:cNvPr>
+          <p:cNvSpPr>
+            <a:spLocks noGrp="1"/>
+          </p:cNvSpPr>
+          <p:nvPr>
+            <p:ph type="dt" sz="half" idx="10"/>
+          </p:nvPr>
+        </p:nvSpPr>
+        <p:spPr>
+          <a:xfrm>
+            <a:off x="838200" y="6356350"/>
+            <a:ext cx="2743200" cy="365125"/>
+          </a:xfrm>
+        </p:spPr>
+        <p:txBody>
+          <a:bodyPr/>
+          <a:lstStyle/>
+          <a:p>
+            <a:fld id="{D4AD37E9-5A10-49A7-855D-CAA2D2E848B6}" type="datetimeFigureOut">
+              <a:rPr lang="de-DE" smtClean="0"/>
+              <a:t>18.01.2022</a:t>
+            </a:fld>
+            <a:endParaRPr lang="de-DE"/>
+          </a:p>
+        </p:txBody>
+      </p:sp>
+      <p:sp>
+        <p:nvSpPr>
+          <p:cNvPr id="8" name="Footer Placeholder 4">
+            <a:extLst>
+              <a:ext uri="{FF2B5EF4-FFF2-40B4-BE49-F238E27FC236}">
+                <a16:creationId xmlns:a16="http://schemas.microsoft.com/office/drawing/2014/main" id="{6833897F-8945-43C1-8EE1-2E83FF8331D9}"/>
+              </a:ext>
+            </a:extLst>
+          </p:cNvPr>
+          <p:cNvSpPr>
+            <a:spLocks noGrp="1"/>
+          </p:cNvSpPr>
+          <p:nvPr>
+            <p:ph type="ftr" sz="quarter" idx="11"/>
+          </p:nvPr>
+        </p:nvSpPr>
+        <p:spPr>
+          <a:xfrm>
+            <a:off x="4038600" y="6356350"/>
+            <a:ext cx="4114800" cy="365125"/>
+          </a:xfrm>
+        </p:spPr>
+        <p:txBody>
+          <a:bodyPr/>
+          <a:lstStyle/>
+          <a:p>
+            <a:r>
+              <a:rPr lang="de-DE" sz="1200" dirty="0" err="1">
+                <a:solidFill>
+                  <a:schemeClr val="tx1">
+                    <a:lumMod val="95000"/>
+                  </a:schemeClr>
+                </a:solidFill>
+              </a:rPr>
+              <a:t>Datetime</a:t>
+            </a:r>
+            <a:r>
+              <a:rPr lang="de-DE" sz="1200" dirty="0">
+                <a:solidFill>
+                  <a:schemeClr val="tx1">
+                    <a:lumMod val="95000"/>
+                  </a:schemeClr>
+                </a:solidFill>
+              </a:rPr>
+              <a:t> </a:t>
+            </a:r>
+            <a:endParaRPr lang="en-US" sz="1200" dirty="0">
+              <a:solidFill>
+                <a:schemeClr val="tx1">
+                  <a:lumMod val="95000"/>
+                </a:schemeClr>
+              </a:solidFill>
+              <a:latin typeface="+mj-lt"/>
+            </a:endParaRPr>
+          </a:p>
+        </p:txBody>
+      </p:sp>
+      <p:sp>
+        <p:nvSpPr>
+          <p:cNvPr id="9" name="Slide Number Placeholder 5">
+            <a:extLst>
+              <a:ext uri="{FF2B5EF4-FFF2-40B4-BE49-F238E27FC236}">
+                <a16:creationId xmlns:a16="http://schemas.microsoft.com/office/drawing/2014/main" id="{4CB1546C-41E9-4CE9-A31D-18CB078FE5F0}"/>
+              </a:ext>
+            </a:extLst>
+          </p:cNvPr>
+          <p:cNvSpPr>
+            <a:spLocks noGrp="1"/>
+          </p:cNvSpPr>
+          <p:nvPr>
+            <p:ph type="sldNum" sz="quarter" idx="12"/>
+          </p:nvPr>
+        </p:nvSpPr>
+        <p:spPr>
+          <a:xfrm>
+            <a:off x="8610600" y="6356350"/>
+            <a:ext cx="2743200" cy="365125"/>
+          </a:xfrm>
+        </p:spPr>
+        <p:txBody>
+          <a:bodyPr/>
+          <a:lstStyle/>
+          <a:p>
+            <a:fld id="{312A73BE-F097-4DBB-AEB2-4CC070160BA0}" type="slidenum">
+              <a:rPr lang="de-DE" smtClean="0"/>
+              <a:t>10</a:t>
+            </a:fld>
+            <a:endParaRPr lang="de-DE"/>
+          </a:p>
+        </p:txBody>
+      </p:sp>
+    </p:spTree>
+    <p:extLst>
+      <p:ext uri="{BB962C8B-B14F-4D97-AF65-F5344CB8AC3E}">
+        <p14:creationId xmlns:p14="http://schemas.microsoft.com/office/powerpoint/2010/main" val="3812299053"/>
+      </p:ext>
+    </p:extLst>
+  </p:cSld>
+  <p:clrMapOvr>
+    <a:masterClrMapping/>
+  </p:clrMapOvr>
+  <p:timing>
+    <p:tnLst>
+      <p:par>
+        <p:cTn id="1" dur="indefinite" restart="never" nodeType="tmRoot">
+          <p:childTnLst>
+            <p:seq concurrent="1" nextAc="seek">
+              <p:cTn id="2" dur="indefinite" nodeType="mainSeq">
+                <p:childTnLst>
+                  <p:par>
+                    <p:cTn id="3" fill="hold">
+                      <p:stCondLst>
+                        <p:cond delay="indefinite"/>
+                      </p:stCondLst>
+                      <p:childTnLst>
+                        <p:par>
+                          <p:cTn id="4" fill="hold">
+                            <p:stCondLst>
+                              <p:cond delay="0"/>
+                            </p:stCondLst>
+                            <p:childTnLst>
+                              <p:par>
+                                <p:cTn id="5" presetID="10" presetClass="entr" presetSubtype="0" fill="hold" nodeType="clickEffect">
+                                  <p:stCondLst>
+                                    <p:cond delay="0"/>
+                                  </p:stCondLst>
+                                  <p:childTnLst>
+                                    <p:set>
+                                      <p:cBhvr>
+                                        <p:cTn id="6" dur="1" fill="hold">
+                                          <p:stCondLst>
+                                            <p:cond delay="0"/>
+                                          </p:stCondLst>
+                                        </p:cTn>
+                                        <p:tgtEl>
+                                          <p:spTgt spid="6">
+                                            <p:txEl>
+                                              <p:pRg st="0" end="0"/>
+                                            </p:txEl>
+                                          </p:spTgt>
+                                        </p:tgtEl>
+                                        <p:attrNameLst>
+                                          <p:attrName>style.visibility</p:attrName>
+                                        </p:attrNameLst>
+                                      </p:cBhvr>
+                                      <p:to>
+                                        <p:strVal val="visible"/>
+                                      </p:to>
+                                    </p:set>
+                                    <p:animEffect transition="in" filter="fade">
+                                      <p:cBhvr>
+                                        <p:cTn id="7" dur="500"/>
+                                        <p:tgtEl>
+                                          <p:spTgt spid="6">
+                                            <p:txEl>
+                                              <p:pRg st="0" end="0"/>
+                                            </p:txEl>
+                                          </p:spTgt>
+                                        </p:tgtEl>
+                                      </p:cBhvr>
+                                    </p:animEffect>
+                                  </p:childTnLst>
+                                </p:cTn>
+                              </p:par>
+                            </p:childTnLst>
+                          </p:cTn>
+                        </p:par>
+                      </p:childTnLst>
+                    </p:cTn>
+                  </p:par>
+                  <p:par>
+                    <p:cTn id="8" fill="hold">
+                      <p:stCondLst>
+                        <p:cond delay="indefinite"/>
+                      </p:stCondLst>
+                      <p:childTnLst>
+                        <p:par>
+                          <p:cTn id="9" fill="hold">
+                            <p:stCondLst>
+                              <p:cond delay="0"/>
+                            </p:stCondLst>
+                            <p:childTnLst>
+                              <p:par>
+                                <p:cTn id="10" presetID="10" presetClass="entr" presetSubtype="0" fill="hold" nodeType="clickEffect">
+                                  <p:stCondLst>
+                                    <p:cond delay="0"/>
+                                  </p:stCondLst>
+                                  <p:childTnLst>
+                                    <p:set>
+                                      <p:cBhvr>
+                                        <p:cTn id="11" dur="1" fill="hold">
+                                          <p:stCondLst>
+                                            <p:cond delay="0"/>
+                                          </p:stCondLst>
+                                        </p:cTn>
+                                        <p:tgtEl>
+                                          <p:spTgt spid="6">
+                                            <p:txEl>
+                                              <p:pRg st="2" end="2"/>
+                                            </p:txEl>
+                                          </p:spTgt>
+                                        </p:tgtEl>
+                                        <p:attrNameLst>
+                                          <p:attrName>style.visibility</p:attrName>
+                                        </p:attrNameLst>
+                                      </p:cBhvr>
+                                      <p:to>
+                                        <p:strVal val="visible"/>
+                                      </p:to>
+                                    </p:set>
+                                    <p:animEffect transition="in" filter="fade">
+                                      <p:cBhvr>
+                                        <p:cTn id="12" dur="500"/>
+                                        <p:tgtEl>
+                                          <p:spTgt spid="6">
+                                            <p:txEl>
+                                              <p:pRg st="2" end="2"/>
+                                            </p:txEl>
+                                          </p:spTgt>
+                                        </p:tgtEl>
+                                      </p:cBhvr>
+                                    </p:animEffect>
+                                  </p:childTnLst>
+                                </p:cTn>
+                              </p:par>
+                            </p:childTnLst>
+                          </p:cTn>
+                        </p:par>
+                      </p:childTnLst>
+                    </p:cTn>
+                  </p:par>
+                  <p:par>
+                    <p:cTn id="13" fill="hold">
+                      <p:stCondLst>
+                        <p:cond delay="indefinite"/>
+                      </p:stCondLst>
+                      <p:childTnLst>
+                        <p:par>
+                          <p:cTn id="14" fill="hold">
+                            <p:stCondLst>
+                              <p:cond delay="0"/>
+                            </p:stCondLst>
+                            <p:childTnLst>
+                              <p:par>
+                                <p:cTn id="15" presetID="10" presetClass="entr" presetSubtype="0" fill="hold" nodeType="clickEffect">
+                                  <p:stCondLst>
+                                    <p:cond delay="0"/>
+                                  </p:stCondLst>
+                                  <p:childTnLst>
+                                    <p:set>
+                                      <p:cBhvr>
+                                        <p:cTn id="16" dur="1" fill="hold">
+                                          <p:stCondLst>
+                                            <p:cond delay="0"/>
+                                          </p:stCondLst>
+                                        </p:cTn>
+                                        <p:tgtEl>
+                                          <p:spTgt spid="6">
+                                            <p:txEl>
+                                              <p:pRg st="3" end="3"/>
+                                            </p:txEl>
+                                          </p:spTgt>
+                                        </p:tgtEl>
+                                        <p:attrNameLst>
+                                          <p:attrName>style.visibility</p:attrName>
+                                        </p:attrNameLst>
+                                      </p:cBhvr>
+                                      <p:to>
+                                        <p:strVal val="visible"/>
+                                      </p:to>
+                                    </p:set>
+                                    <p:animEffect transition="in" filter="fade">
+                                      <p:cBhvr>
+                                        <p:cTn id="17" dur="500"/>
+                                        <p:tgtEl>
+                                          <p:spTgt spid="6">
+                                            <p:txEl>
+                                              <p:pRg st="3" end="3"/>
+                                            </p:txEl>
+                                          </p:spTgt>
+                                        </p:tgtEl>
+                                      </p:cBhvr>
+                                    </p:animEffect>
+                                  </p:childTnLst>
+                                </p:cTn>
+                              </p:par>
+                            </p:childTnLst>
+                          </p:cTn>
+                        </p:par>
+                      </p:childTnLst>
+                    </p:cTn>
+                  </p:par>
+                  <p:par>
+                    <p:cTn id="18" fill="hold">
+                      <p:stCondLst>
+                        <p:cond delay="indefinite"/>
+                      </p:stCondLst>
+                      <p:childTnLst>
+                        <p:par>
+                          <p:cTn id="19" fill="hold">
+                            <p:stCondLst>
+                              <p:cond delay="0"/>
+                            </p:stCondLst>
+                            <p:childTnLst>
+                              <p:par>
+                                <p:cTn id="20" presetID="10" presetClass="entr" presetSubtype="0" fill="hold" nodeType="clickEffect">
+                                  <p:stCondLst>
+                                    <p:cond delay="0"/>
+                                  </p:stCondLst>
+                                  <p:childTnLst>
+                                    <p:set>
+                                      <p:cBhvr>
+                                        <p:cTn id="21" dur="1" fill="hold">
+                                          <p:stCondLst>
+                                            <p:cond delay="0"/>
+                                          </p:stCondLst>
+                                        </p:cTn>
+                                        <p:tgtEl>
+                                          <p:spTgt spid="6">
+                                            <p:txEl>
+                                              <p:pRg st="4" end="4"/>
+                                            </p:txEl>
+                                          </p:spTgt>
+                                        </p:tgtEl>
+                                        <p:attrNameLst>
+                                          <p:attrName>style.visibility</p:attrName>
+                                        </p:attrNameLst>
+                                      </p:cBhvr>
+                                      <p:to>
+                                        <p:strVal val="visible"/>
+                                      </p:to>
+                                    </p:set>
+                                    <p:animEffect transition="in" filter="fade">
+                                      <p:cBhvr>
+                                        <p:cTn id="22" dur="500"/>
+                                        <p:tgtEl>
+                                          <p:spTgt spid="6">
+                                            <p:txEl>
+                                              <p:pRg st="4" end="4"/>
+                                            </p:txEl>
+                                          </p:spTgt>
+                                        </p:tgtEl>
+                                      </p:cBhvr>
+                                    </p:animEffect>
+                                  </p:childTnLst>
+                                </p:cTn>
+                              </p:par>
+                            </p:childTnLst>
+                          </p:cTn>
+                        </p:par>
+                      </p:childTnLst>
+                    </p:cTn>
+                  </p:par>
+                </p:childTnLst>
+              </p:cTn>
+              <p:prevCondLst>
+                <p:cond evt="onPrev" delay="0">
+                  <p:tgtEl>
+                    <p:sldTgt/>
+                  </p:tgtEl>
+                </p:cond>
+              </p:prevCondLst>
+              <p:nextCondLst>
+                <p:cond evt="onNext" delay="0">
+                  <p:tgtEl>
+                    <p:sldTgt/>
+                  </p:tgtEl>
+                </p:cond>
+              </p:nextCondLst>
+            </p:seq>
+          </p:childTnLst>
+        </p:cTn>
+      </p:par>
+    </p:tnLst>
+  </p:timing>
+</p:sld>
+</file>
+
+<file path=ppt/slides/slide11.xml><?xml version="1.0" encoding="utf-8"?>
+<p:sld xmlns:a="http://schemas.openxmlformats.org/drawingml/2006/main" xmlns:r="http://schemas.openxmlformats.org/officeDocument/2006/relationships" xmlns:p="http://schemas.openxmlformats.org/presentationml/2006/main">
+  <p:cSld>
+    <p:spTree>
+      <p:nvGrpSpPr>
+        <p:cNvPr id="1" name=""/>
+        <p:cNvGrpSpPr/>
+        <p:nvPr/>
+      </p:nvGrpSpPr>
+      <p:grpSpPr>
+        <a:xfrm>
+          <a:off x="0" y="0"/>
+          <a:ext cx="0" cy="0"/>
+          <a:chOff x="0" y="0"/>
+          <a:chExt cx="0" cy="0"/>
+        </a:xfrm>
+      </p:grpSpPr>
+      <p:sp>
+        <p:nvSpPr>
+          <p:cNvPr id="5" name="Titel 4">
+            <a:extLst>
+              <a:ext uri="{FF2B5EF4-FFF2-40B4-BE49-F238E27FC236}">
+                <a16:creationId xmlns:a16="http://schemas.microsoft.com/office/drawing/2014/main" id="{BDF2C912-E02F-4E1F-82DF-351A88BA5B31}"/>
+              </a:ext>
+            </a:extLst>
+          </p:cNvPr>
+          <p:cNvSpPr>
+            <a:spLocks noGrp="1"/>
+          </p:cNvSpPr>
+          <p:nvPr>
+            <p:ph type="title"/>
+          </p:nvPr>
+        </p:nvSpPr>
+        <p:spPr>
+          <a:xfrm>
+            <a:off x="838200" y="365125"/>
+            <a:ext cx="7958667" cy="1137104"/>
+          </a:xfrm>
+        </p:spPr>
+        <p:txBody>
+          <a:bodyPr anchor="b">
+            <a:normAutofit/>
+          </a:bodyPr>
+          <a:lstStyle/>
+          <a:p>
+            <a:r>
+              <a:rPr lang="de-DE" sz="4400" dirty="0" err="1">
+                <a:solidFill>
+                  <a:schemeClr val="tx1">
+                    <a:lumMod val="95000"/>
+                  </a:schemeClr>
+                </a:solidFill>
+              </a:rPr>
+              <a:t>tzinfo</a:t>
+            </a:r>
+            <a:endParaRPr lang="de-DE" sz="4400" dirty="0">
+              <a:solidFill>
+                <a:schemeClr val="tx1">
+                  <a:lumMod val="95000"/>
+                </a:schemeClr>
+              </a:solidFill>
+            </a:endParaRPr>
+          </a:p>
+        </p:txBody>
+      </p:sp>
+      <p:sp>
+        <p:nvSpPr>
+          <p:cNvPr id="6" name="Inhaltsplatzhalter 5">
+            <a:extLst>
+              <a:ext uri="{FF2B5EF4-FFF2-40B4-BE49-F238E27FC236}">
+                <a16:creationId xmlns:a16="http://schemas.microsoft.com/office/drawing/2014/main" id="{67FD4DD5-46C1-4974-A569-BB95F27DCC4F}"/>
+              </a:ext>
+            </a:extLst>
+          </p:cNvPr>
+          <p:cNvSpPr>
+            <a:spLocks noGrp="1"/>
+          </p:cNvSpPr>
+          <p:nvPr>
+            <p:ph idx="1"/>
+          </p:nvPr>
+        </p:nvSpPr>
+        <p:spPr>
+          <a:xfrm>
+            <a:off x="838201" y="1825625"/>
+            <a:ext cx="7958666" cy="4351338"/>
+          </a:xfrm>
+        </p:spPr>
+        <p:txBody>
+          <a:bodyPr>
+            <a:normAutofit/>
+          </a:bodyPr>
+          <a:lstStyle/>
+          <a:p>
+            <a:r>
+              <a:rPr lang="de-DE" sz="2400" dirty="0" err="1">
+                <a:solidFill>
+                  <a:schemeClr val="tx1">
+                    <a:lumMod val="95000"/>
+                  </a:schemeClr>
+                </a:solidFill>
+              </a:rPr>
+              <a:t>tzinfo</a:t>
+            </a:r>
+            <a:r>
+              <a:rPr lang="de-DE" sz="2400" dirty="0">
+                <a:solidFill>
+                  <a:schemeClr val="tx1">
+                    <a:lumMod val="95000"/>
+                  </a:schemeClr>
+                </a:solidFill>
+              </a:rPr>
+              <a:t> -Klasse dient der Implementierung von Zeitzonen für Zeit- und Datums-Objekten.</a:t>
+            </a:r>
+            <a:endParaRPr lang="de-DE" sz="2000" dirty="0">
+              <a:solidFill>
+                <a:schemeClr val="tx1">
+                  <a:lumMod val="95000"/>
+                </a:schemeClr>
+              </a:solidFill>
+            </a:endParaRPr>
+          </a:p>
+          <a:p>
+            <a:pPr marL="0" indent="0">
+              <a:buNone/>
+            </a:pPr>
+            <a:endParaRPr lang="de-DE" sz="2000" dirty="0">
+              <a:solidFill>
+                <a:schemeClr val="tx1">
+                  <a:lumMod val="95000"/>
+                </a:schemeClr>
+              </a:solidFill>
+            </a:endParaRPr>
+          </a:p>
+        </p:txBody>
+      </p:sp>
+      <p:sp>
+        <p:nvSpPr>
+          <p:cNvPr id="7" name="Date Placeholder 3">
+            <a:extLst>
+              <a:ext uri="{FF2B5EF4-FFF2-40B4-BE49-F238E27FC236}">
+                <a16:creationId xmlns:a16="http://schemas.microsoft.com/office/drawing/2014/main" id="{18705B3C-262D-45A3-8C90-9FC26244A8CC}"/>
+              </a:ext>
+            </a:extLst>
+          </p:cNvPr>
+          <p:cNvSpPr>
+            <a:spLocks noGrp="1"/>
+          </p:cNvSpPr>
+          <p:nvPr>
+            <p:ph type="dt" sz="half" idx="10"/>
+          </p:nvPr>
+        </p:nvSpPr>
+        <p:spPr>
+          <a:xfrm>
+            <a:off x="838200" y="6356350"/>
+            <a:ext cx="2743200" cy="365125"/>
+          </a:xfrm>
+        </p:spPr>
+        <p:txBody>
+          <a:bodyPr/>
+          <a:lstStyle/>
+          <a:p>
+            <a:fld id="{D4AD37E9-5A10-49A7-855D-CAA2D2E848B6}" type="datetimeFigureOut">
+              <a:rPr lang="de-DE" smtClean="0"/>
+              <a:t>18.01.2022</a:t>
+            </a:fld>
+            <a:endParaRPr lang="de-DE"/>
+          </a:p>
+        </p:txBody>
+      </p:sp>
+      <p:sp>
+        <p:nvSpPr>
+          <p:cNvPr id="8" name="Footer Placeholder 4">
+            <a:extLst>
+              <a:ext uri="{FF2B5EF4-FFF2-40B4-BE49-F238E27FC236}">
+                <a16:creationId xmlns:a16="http://schemas.microsoft.com/office/drawing/2014/main" id="{6833897F-8945-43C1-8EE1-2E83FF8331D9}"/>
+              </a:ext>
+            </a:extLst>
+          </p:cNvPr>
+          <p:cNvSpPr>
+            <a:spLocks noGrp="1"/>
+          </p:cNvSpPr>
+          <p:nvPr>
+            <p:ph type="ftr" sz="quarter" idx="11"/>
+          </p:nvPr>
+        </p:nvSpPr>
+        <p:spPr>
+          <a:xfrm>
+            <a:off x="4038600" y="6356350"/>
+            <a:ext cx="4114800" cy="365125"/>
+          </a:xfrm>
+        </p:spPr>
+        <p:txBody>
+          <a:bodyPr/>
+          <a:lstStyle/>
+          <a:p>
+            <a:r>
+              <a:rPr lang="de-DE" sz="1200" dirty="0" err="1">
+                <a:solidFill>
+                  <a:schemeClr val="tx1">
+                    <a:lumMod val="95000"/>
+                  </a:schemeClr>
+                </a:solidFill>
+              </a:rPr>
+              <a:t>Datetime</a:t>
+            </a:r>
+            <a:r>
+              <a:rPr lang="de-DE" sz="1200" dirty="0">
+                <a:solidFill>
+                  <a:schemeClr val="tx1">
+                    <a:lumMod val="95000"/>
+                  </a:schemeClr>
+                </a:solidFill>
+              </a:rPr>
+              <a:t> </a:t>
+            </a:r>
+            <a:endParaRPr lang="en-US" sz="1200" dirty="0">
+              <a:solidFill>
+                <a:schemeClr val="tx1">
+                  <a:lumMod val="95000"/>
+                </a:schemeClr>
+              </a:solidFill>
+              <a:latin typeface="+mj-lt"/>
+            </a:endParaRPr>
+          </a:p>
+        </p:txBody>
+      </p:sp>
+      <p:sp>
+        <p:nvSpPr>
+          <p:cNvPr id="9" name="Slide Number Placeholder 5">
+            <a:extLst>
+              <a:ext uri="{FF2B5EF4-FFF2-40B4-BE49-F238E27FC236}">
+                <a16:creationId xmlns:a16="http://schemas.microsoft.com/office/drawing/2014/main" id="{4CB1546C-41E9-4CE9-A31D-18CB078FE5F0}"/>
+              </a:ext>
+            </a:extLst>
+          </p:cNvPr>
+          <p:cNvSpPr>
+            <a:spLocks noGrp="1"/>
+          </p:cNvSpPr>
+          <p:nvPr>
+            <p:ph type="sldNum" sz="quarter" idx="12"/>
+          </p:nvPr>
+        </p:nvSpPr>
+        <p:spPr>
+          <a:xfrm>
+            <a:off x="8610600" y="6356350"/>
+            <a:ext cx="2743200" cy="365125"/>
+          </a:xfrm>
+        </p:spPr>
+        <p:txBody>
+          <a:bodyPr/>
+          <a:lstStyle/>
+          <a:p>
+            <a:fld id="{312A73BE-F097-4DBB-AEB2-4CC070160BA0}" type="slidenum">
+              <a:rPr lang="de-DE" smtClean="0"/>
+              <a:t>11</a:t>
+            </a:fld>
+            <a:endParaRPr lang="de-DE"/>
+          </a:p>
+        </p:txBody>
+      </p:sp>
+    </p:spTree>
+    <p:extLst>
+      <p:ext uri="{BB962C8B-B14F-4D97-AF65-F5344CB8AC3E}">
+        <p14:creationId xmlns:p14="http://schemas.microsoft.com/office/powerpoint/2010/main" val="3587439316"/>
+      </p:ext>
+    </p:extLst>
+  </p:cSld>
+  <p:clrMapOvr>
+    <a:masterClrMapping/>
+  </p:clrMapOvr>
+  <p:timing>
+    <p:tnLst>
+      <p:par>
+        <p:cTn id="1" dur="indefinite" restart="never" nodeType="tmRoot">
+          <p:childTnLst>
+            <p:seq concurrent="1" nextAc="seek">
+              <p:cTn id="2" dur="indefinite" nodeType="mainSeq">
+                <p:childTnLst>
+                  <p:par>
+                    <p:cTn id="3" fill="hold">
+                      <p:stCondLst>
+                        <p:cond delay="indefinite"/>
+                      </p:stCondLst>
+                      <p:childTnLst>
+                        <p:par>
+                          <p:cTn id="4" fill="hold">
+                            <p:stCondLst>
+                              <p:cond delay="0"/>
+                            </p:stCondLst>
+                            <p:childTnLst>
+                              <p:par>
+                                <p:cTn id="5" presetID="10" presetClass="entr" presetSubtype="0" fill="hold" nodeType="clickEffect">
+                                  <p:stCondLst>
+                                    <p:cond delay="0"/>
+                                  </p:stCondLst>
+                                  <p:childTnLst>
+                                    <p:set>
+                                      <p:cBhvr>
+                                        <p:cTn id="6" dur="1" fill="hold">
+                                          <p:stCondLst>
+                                            <p:cond delay="0"/>
+                                          </p:stCondLst>
+                                        </p:cTn>
+                                        <p:tgtEl>
+                                          <p:spTgt spid="6">
+                                            <p:txEl>
+                                              <p:pRg st="0" end="0"/>
+                                            </p:txEl>
+                                          </p:spTgt>
+                                        </p:tgtEl>
+                                        <p:attrNameLst>
+                                          <p:attrName>style.visibility</p:attrName>
+                                        </p:attrNameLst>
+                                      </p:cBhvr>
+                                      <p:to>
+                                        <p:strVal val="visible"/>
+                                      </p:to>
+                                    </p:set>
+                                    <p:animEffect transition="in" filter="fade">
+                                      <p:cBhvr>
+                                        <p:cTn id="7" dur="500"/>
+                                        <p:tgtEl>
+                                          <p:spTgt spid="6">
+                                            <p:txEl>
+                                              <p:pRg st="0" end="0"/>
+                                            </p:txEl>
+                                          </p:spTgt>
+                                        </p:tgtEl>
+                                      </p:cBhvr>
+                                    </p:animEffect>
+                                  </p:childTnLst>
+                                </p:cTn>
+                              </p:par>
+                            </p:childTnLst>
+                          </p:cTn>
+                        </p:par>
+                      </p:childTnLst>
+                    </p:cTn>
+                  </p:par>
+                </p:childTnLst>
+              </p:cTn>
+              <p:prevCondLst>
+                <p:cond evt="onPrev" delay="0">
+                  <p:tgtEl>
+                    <p:sldTgt/>
+                  </p:tgtEl>
+                </p:cond>
+              </p:prevCondLst>
+              <p:nextCondLst>
+                <p:cond evt="onNext" delay="0">
+                  <p:tgtEl>
+                    <p:sldTgt/>
+                  </p:tgtEl>
+                </p:cond>
+              </p:nextCondLst>
+            </p:seq>
+          </p:childTnLst>
+        </p:cTn>
+      </p:par>
+    </p:tnLst>
+  </p:timing>
+</p:sld>
+</file>
+
 <file path=ppt/slides/slide2.xml><?xml version="1.0" encoding="utf-8"?>
 <p:sld xmlns:a="http://schemas.openxmlformats.org/drawingml/2006/main" xmlns:r="http://schemas.openxmlformats.org/officeDocument/2006/relationships" xmlns:p="http://schemas.openxmlformats.org/presentationml/2006/main">
   <p:cSld>
@@ -7057,7 +8032,7 @@
                   </a:schemeClr>
                 </a:solidFill>
               </a:rPr>
-              <a:t>Was kann </a:t>
+              <a:t>Die </a:t>
             </a:r>
             <a:r>
               <a:rPr lang="de-DE" sz="2400" dirty="0" err="1">
@@ -7067,84 +8042,54 @@
                   </a:schemeClr>
                 </a:solidFill>
               </a:rPr>
+              <a:t>Datetime</a:t>
+            </a:r>
+            <a:r>
+              <a:rPr lang="de-DE" sz="2400" dirty="0">
+                <a:solidFill>
+                  <a:schemeClr val="tx1">
+                    <a:lumMod val="95000"/>
+                  </a:schemeClr>
+                </a:solidFill>
+              </a:rPr>
+              <a:t> Klassen</a:t>
+            </a:r>
+          </a:p>
+          <a:p>
+            <a:r>
+              <a:rPr lang="de-DE" sz="2400" dirty="0">
+                <a:solidFill>
+                  <a:schemeClr val="tx1">
+                    <a:lumMod val="95000"/>
+                  </a:schemeClr>
+                </a:solidFill>
+              </a:rPr>
+              <a:t>date</a:t>
+            </a:r>
+          </a:p>
+          <a:p>
+            <a:r>
+              <a:rPr lang="de-DE" sz="2400" dirty="0">
+                <a:solidFill>
+                  <a:schemeClr val="tx1">
+                    <a:lumMod val="95000"/>
+                  </a:schemeClr>
+                </a:solidFill>
+              </a:rPr>
+              <a:t>time</a:t>
+            </a:r>
+          </a:p>
+          <a:p>
+            <a:r>
+              <a:rPr lang="de-DE" sz="2400" dirty="0" err="1">
+                <a:solidFill>
+                  <a:schemeClr val="tx1">
+                    <a:lumMod val="95000"/>
+                  </a:schemeClr>
+                </a:solidFill>
+              </a:rPr>
               <a:t>datetime</a:t>
             </a:r>
-            <a:r>
-              <a:rPr lang="de-DE" sz="2400" dirty="0">
-                <a:solidFill>
-                  <a:schemeClr val="tx1">
-                    <a:lumMod val="95000"/>
-                  </a:schemeClr>
-                </a:solidFill>
-              </a:rPr>
-              <a:t> ?</a:t>
-            </a:r>
-          </a:p>
-          <a:p>
-            <a:r>
-              <a:rPr lang="de-DE" sz="2400" dirty="0">
-                <a:solidFill>
-                  <a:schemeClr val="tx1">
-                    <a:lumMod val="95000"/>
-                  </a:schemeClr>
-                </a:solidFill>
-              </a:rPr>
-              <a:t>Was kann </a:t>
-            </a:r>
-            <a:r>
-              <a:rPr lang="de-DE" sz="2400" dirty="0" err="1">
-                <a:solidFill>
-                  <a:schemeClr val="tx1">
-                    <a:lumMod val="95000"/>
-                  </a:schemeClr>
-                </a:solidFill>
-              </a:rPr>
-              <a:t>strftime</a:t>
-            </a:r>
-            <a:r>
-              <a:rPr lang="de-DE" sz="2400" dirty="0">
-                <a:solidFill>
-                  <a:schemeClr val="tx1">
-                    <a:lumMod val="95000"/>
-                  </a:schemeClr>
-                </a:solidFill>
-              </a:rPr>
-              <a:t> ?</a:t>
-            </a:r>
-          </a:p>
-          <a:p>
-            <a:r>
-              <a:rPr lang="de-DE" sz="2400" dirty="0">
-                <a:solidFill>
-                  <a:schemeClr val="tx1">
-                    <a:lumMod val="95000"/>
-                  </a:schemeClr>
-                </a:solidFill>
-              </a:rPr>
-              <a:t>Was kann </a:t>
-            </a:r>
-            <a:r>
-              <a:rPr lang="de-DE" sz="2400" dirty="0" err="1">
-                <a:solidFill>
-                  <a:schemeClr val="tx1">
-                    <a:lumMod val="95000"/>
-                  </a:schemeClr>
-                </a:solidFill>
-              </a:rPr>
-              <a:t>strptime</a:t>
-            </a:r>
-            <a:r>
-              <a:rPr lang="de-DE" sz="2400" dirty="0">
-                <a:solidFill>
-                  <a:schemeClr val="tx1">
-                    <a:lumMod val="95000"/>
-                  </a:schemeClr>
-                </a:solidFill>
-              </a:rPr>
-              <a:t> ?</a:t>
-            </a:r>
-          </a:p>
-          <a:p>
             <a:endParaRPr lang="de-DE" sz="2400" dirty="0">
               <a:solidFill>
                 <a:schemeClr val="tx1">
@@ -7153,6 +8098,97 @@
               </a:solidFill>
             </a:endParaRPr>
           </a:p>
+          <a:p>
+            <a:r>
+              <a:rPr lang="de-DE" sz="2400" dirty="0" err="1">
+                <a:solidFill>
+                  <a:schemeClr val="tx1">
+                    <a:lumMod val="95000"/>
+                  </a:schemeClr>
+                </a:solidFill>
+              </a:rPr>
+              <a:t>strftime</a:t>
+            </a:r>
+            <a:r>
+              <a:rPr lang="de-DE" sz="2400" dirty="0">
+                <a:solidFill>
+                  <a:schemeClr val="tx1">
+                    <a:lumMod val="95000"/>
+                  </a:schemeClr>
+                </a:solidFill>
+              </a:rPr>
+              <a:t> </a:t>
+            </a:r>
+          </a:p>
+          <a:p>
+            <a:r>
+              <a:rPr lang="de-DE" sz="2400" dirty="0" err="1">
+                <a:solidFill>
+                  <a:schemeClr val="tx1">
+                    <a:lumMod val="95000"/>
+                  </a:schemeClr>
+                </a:solidFill>
+              </a:rPr>
+              <a:t>strptime</a:t>
+            </a:r>
+            <a:r>
+              <a:rPr lang="de-DE" sz="2400" dirty="0">
+                <a:solidFill>
+                  <a:schemeClr val="tx1">
+                    <a:lumMod val="95000"/>
+                  </a:schemeClr>
+                </a:solidFill>
+              </a:rPr>
+              <a:t> </a:t>
+            </a:r>
+          </a:p>
+          <a:p>
+            <a:r>
+              <a:rPr lang="de-DE" sz="2400" dirty="0" err="1">
+                <a:solidFill>
+                  <a:schemeClr val="tx1">
+                    <a:lumMod val="95000"/>
+                  </a:schemeClr>
+                </a:solidFill>
+              </a:rPr>
+              <a:t>timedelta</a:t>
+            </a:r>
+            <a:endParaRPr lang="de-DE" sz="2400" dirty="0">
+              <a:solidFill>
+                <a:schemeClr val="tx1">
+                  <a:lumMod val="95000"/>
+                </a:schemeClr>
+              </a:solidFill>
+            </a:endParaRPr>
+          </a:p>
+          <a:p>
+            <a:r>
+              <a:rPr lang="de-DE" sz="2400" dirty="0" err="1">
+                <a:solidFill>
+                  <a:schemeClr val="tx1">
+                    <a:lumMod val="95000"/>
+                  </a:schemeClr>
+                </a:solidFill>
+              </a:rPr>
+              <a:t>tzinfo</a:t>
+            </a:r>
+            <a:endParaRPr lang="de-DE" sz="2400" dirty="0">
+              <a:solidFill>
+                <a:schemeClr val="tx1">
+                  <a:lumMod val="95000"/>
+                </a:schemeClr>
+              </a:solidFill>
+            </a:endParaRPr>
+          </a:p>
+          <a:p>
+            <a:endParaRPr lang="de-DE" sz="2400" dirty="0">
+              <a:solidFill>
+                <a:schemeClr val="tx1">
+                  <a:lumMod val="95000"/>
+                </a:schemeClr>
+              </a:solidFill>
+            </a:endParaRPr>
+          </a:p>
         </p:txBody>
       </p:sp>
       <p:sp>
@@ -7183,7 +8219,7 @@
           <a:p>
             <a:fld id="{D4AD37E9-5A10-49A7-855D-CAA2D2E848B6}" type="datetimeFigureOut">
               <a:rPr lang="de-DE" smtClean="0"/>
-              <a:t>29.07.21</a:t>
+              <a:t>18.01.2022</a:t>
             </a:fld>
             <a:endParaRPr lang="de-DE"/>
           </a:p>
@@ -7335,7 +8371,7 @@
                   </a:schemeClr>
                 </a:solidFill>
               </a:rPr>
-              <a:t>Wozu benötiget man </a:t>
+              <a:t>Wozu benötigt man </a:t>
             </a:r>
             <a:r>
               <a:rPr lang="de-DE" sz="4400" dirty="0" err="1">
@@ -7540,7 +8576,7 @@
           <a:p>
             <a:fld id="{D4AD37E9-5A10-49A7-855D-CAA2D2E848B6}" type="datetimeFigureOut">
               <a:rPr lang="de-DE" smtClean="0"/>
-              <a:t>29.07.21</a:t>
+              <a:t>18.01.2022</a:t>
             </a:fld>
             <a:endParaRPr lang="de-DE"/>
           </a:p>
@@ -8099,7 +9135,7 @@
                   </a:schemeClr>
                 </a:solidFill>
               </a:rPr>
-              <a:t>Was kann </a:t>
+              <a:t>Die </a:t>
             </a:r>
             <a:r>
               <a:rPr lang="de-DE" sz="4400" dirty="0" err="1">
@@ -8109,7 +9145,7 @@
                   </a:schemeClr>
                 </a:solidFill>
               </a:rPr>
-              <a:t>datetime</a:t>
+              <a:t>Datetime</a:t>
             </a:r>
             <a:r>
               <a:rPr lang="de-DE" sz="4400" dirty="0">
@@ -8119,7 +9155,7 @@
                   </a:schemeClr>
                 </a:solidFill>
               </a:rPr>
-              <a:t> ?</a:t>
+              <a:t> Klassen</a:t>
             </a:r>
           </a:p>
         </p:txBody>
@@ -8152,6 +9188,9 @@
           </a:bodyPr>
           <a:lstStyle/>
           <a:p>
+            <a:pPr marL="0" indent="0">
+              <a:buNone/>
+            </a:pPr>
             <a:r>
               <a:rPr lang="de-DE" sz="2400" dirty="0">
                 <a:solidFill>
@@ -8160,7 +9199,7 @@
                   </a:schemeClr>
                 </a:solidFill>
               </a:rPr>
-              <a:t>Mit </a:t>
+              <a:t>Die </a:t>
             </a:r>
             <a:r>
               <a:rPr lang="de-DE" sz="2400" dirty="0" err="1">
@@ -8170,41 +9209,134 @@
                   </a:schemeClr>
                 </a:solidFill>
               </a:rPr>
+              <a:t>Datetime</a:t>
+            </a:r>
+            <a:r>
+              <a:rPr lang="de-DE" sz="2400" dirty="0">
+                <a:solidFill>
+                  <a:schemeClr val="tx1">
+                    <a:lumMod val="95000"/>
+                  </a:schemeClr>
+                </a:solidFill>
+              </a:rPr>
+              <a:t> Klassen werden in Python in 5 Hauptklassen Kategorisiert.</a:t>
+            </a:r>
+          </a:p>
+          <a:p>
+            <a:pPr marL="0" indent="0">
+              <a:buNone/>
+            </a:pPr>
+            <a:endParaRPr lang="de-DE" sz="2400" dirty="0">
+              <a:solidFill>
+                <a:schemeClr val="tx1">
+                  <a:lumMod val="95000"/>
+                </a:schemeClr>
+              </a:solidFill>
+            </a:endParaRPr>
+          </a:p>
+          <a:p>
+            <a:pPr marL="914400" lvl="1" indent="-457200">
+              <a:buFont typeface="+mj-lt"/>
+              <a:buAutoNum type="arabicPeriod"/>
+            </a:pPr>
+            <a:r>
+              <a:rPr lang="en-US" sz="2000" dirty="0">
+                <a:solidFill>
+                  <a:schemeClr val="tx1">
+                    <a:lumMod val="95000"/>
+                  </a:schemeClr>
+                </a:solidFill>
+              </a:rPr>
+              <a:t>date – </a:t>
+            </a:r>
+            <a:r>
+              <a:rPr lang="de-DE" sz="2000" dirty="0">
+                <a:solidFill>
+                  <a:schemeClr val="tx1">
+                    <a:lumMod val="95000"/>
+                  </a:schemeClr>
+                </a:solidFill>
+              </a:rPr>
+              <a:t>Ausgabe des Datums</a:t>
+            </a:r>
+            <a:r>
+              <a:rPr lang="en-US" sz="2000" dirty="0">
+                <a:solidFill>
+                  <a:schemeClr val="tx1">
+                    <a:lumMod val="95000"/>
+                  </a:schemeClr>
+                </a:solidFill>
+              </a:rPr>
+              <a:t>( Monat, Tag, </a:t>
+            </a:r>
+            <a:r>
+              <a:rPr lang="en-US" sz="2000" dirty="0" err="1">
+                <a:solidFill>
+                  <a:schemeClr val="tx1">
+                    <a:lumMod val="95000"/>
+                  </a:schemeClr>
+                </a:solidFill>
+              </a:rPr>
+              <a:t>Jahr</a:t>
+            </a:r>
+            <a:r>
+              <a:rPr lang="en-US" sz="2000" dirty="0">
+                <a:solidFill>
+                  <a:schemeClr val="tx1">
+                    <a:lumMod val="95000"/>
+                  </a:schemeClr>
+                </a:solidFill>
+              </a:rPr>
+              <a:t>)</a:t>
+            </a:r>
+          </a:p>
+          <a:p>
+            <a:pPr marL="914400" lvl="1" indent="-457200">
+              <a:buFont typeface="+mj-lt"/>
+              <a:buAutoNum type="arabicPeriod"/>
+            </a:pPr>
+            <a:r>
+              <a:rPr lang="de-DE" sz="2000" dirty="0">
+                <a:solidFill>
+                  <a:schemeClr val="tx1">
+                    <a:lumMod val="95000"/>
+                  </a:schemeClr>
+                </a:solidFill>
+              </a:rPr>
+              <a:t>time – Tag unabhängige Zeit (Stunde, Minute, Sekunde, Millisekunde)</a:t>
+            </a:r>
+          </a:p>
+          <a:p>
+            <a:pPr marL="914400" lvl="1" indent="-457200">
+              <a:buFont typeface="+mj-lt"/>
+              <a:buAutoNum type="arabicPeriod"/>
+            </a:pPr>
+            <a:r>
+              <a:rPr lang="de-DE" sz="2000" dirty="0" err="1">
+                <a:solidFill>
+                  <a:schemeClr val="tx1">
+                    <a:lumMod val="95000"/>
+                  </a:schemeClr>
+                </a:solidFill>
+              </a:rPr>
               <a:t>datetime</a:t>
             </a:r>
             <a:r>
-              <a:rPr lang="de-DE" sz="2400" dirty="0">
-                <a:solidFill>
-                  <a:schemeClr val="tx1">
-                    <a:lumMod val="95000"/>
-                  </a:schemeClr>
-                </a:solidFill>
-              </a:rPr>
-              <a:t> können wir </a:t>
-            </a:r>
-            <a:r>
-              <a:rPr lang="de-DE" sz="2400" dirty="0" err="1">
-                <a:solidFill>
-                  <a:schemeClr val="tx1">
-                    <a:lumMod val="95000"/>
-                  </a:schemeClr>
-                </a:solidFill>
-              </a:rPr>
-              <a:t>z.b</a:t>
-            </a:r>
-            <a:r>
-              <a:rPr lang="de-DE" sz="2400" dirty="0">
-                <a:solidFill>
-                  <a:schemeClr val="tx1">
-                    <a:lumMod val="95000"/>
-                  </a:schemeClr>
-                </a:solidFill>
-              </a:rPr>
-              <a:t> das Aktuelle Datum und die Uhrzeit ausgeben lassen</a:t>
-            </a:r>
-          </a:p>
-          <a:p>
-            <a:pPr lvl="1"/>
+              <a:rPr lang="de-DE" sz="2000" dirty="0">
+                <a:solidFill>
+                  <a:schemeClr val="tx1">
+                    <a:lumMod val="95000"/>
+                  </a:schemeClr>
+                </a:solidFill>
+              </a:rPr>
+              <a:t> – Kombination aus „time und date“</a:t>
+            </a:r>
+          </a:p>
+          <a:p>
+            <a:pPr marL="914400" lvl="1" indent="-457200">
+              <a:buFont typeface="+mj-lt"/>
+              <a:buAutoNum type="arabicPeriod"/>
+            </a:pPr>
             <a:r>
               <a:rPr lang="de-DE" sz="2000" dirty="0" err="1">
                 <a:solidFill>
@@ -8213,7 +9345,7 @@
                   </a:schemeClr>
                 </a:solidFill>
               </a:rPr>
-              <a:t>now</a:t>
+              <a:t>timedelta</a:t>
             </a:r>
             <a:r>
               <a:rPr lang="de-DE" sz="2000" dirty="0">
@@ -8223,24 +9355,24 @@
                   </a:schemeClr>
                 </a:solidFill>
               </a:rPr>
-              <a:t>()</a:t>
-            </a:r>
-          </a:p>
-          <a:p>
-            <a:pPr lvl="2"/>
-            <a:r>
-              <a:rPr lang="de-DE" sz="1600" dirty="0">
-                <a:solidFill>
-                  <a:schemeClr val="tx1">
-                    <a:lumMod val="95000"/>
-                  </a:schemeClr>
-                </a:solidFill>
-              </a:rPr>
-              <a:t>Gibt uns das Aktuelle Datum und die Uhrzeit aus</a:t>
-            </a:r>
-          </a:p>
-          <a:p>
-            <a:pPr lvl="1"/>
+              <a:t> – Manipulation von Datumswerten</a:t>
+            </a:r>
+          </a:p>
+          <a:p>
+            <a:pPr marL="914400" lvl="1" indent="-457200">
+              <a:buFont typeface="+mj-lt"/>
+              <a:buAutoNum type="arabicPeriod"/>
+            </a:pPr>
+            <a:r>
+              <a:rPr lang="de-DE" sz="2000" dirty="0" err="1">
+                <a:solidFill>
+                  <a:schemeClr val="tx1">
+                    <a:lumMod val="95000"/>
+                  </a:schemeClr>
+                </a:solidFill>
+              </a:rPr>
+              <a:t>tzinfo</a:t>
+            </a:r>
             <a:r>
               <a:rPr lang="de-DE" sz="2000" dirty="0">
                 <a:solidFill>
@@ -8249,81 +9381,21 @@
                   </a:schemeClr>
                 </a:solidFill>
               </a:rPr>
-              <a:t>Das </a:t>
-            </a:r>
-            <a:r>
-              <a:rPr lang="de-DE" sz="2000" dirty="0" err="1">
-                <a:solidFill>
-                  <a:schemeClr val="tx1">
-                    <a:lumMod val="95000"/>
-                  </a:schemeClr>
-                </a:solidFill>
-              </a:rPr>
-              <a:t>datetime</a:t>
-            </a:r>
-            <a:r>
-              <a:rPr lang="de-DE" sz="2000" dirty="0">
-                <a:solidFill>
-                  <a:schemeClr val="tx1">
-                    <a:lumMod val="95000"/>
-                  </a:schemeClr>
-                </a:solidFill>
-              </a:rPr>
-              <a:t>-objekt das </a:t>
-            </a:r>
-            <a:r>
-              <a:rPr lang="de-DE" sz="2000" dirty="0" err="1">
-                <a:solidFill>
-                  <a:schemeClr val="tx1">
-                    <a:lumMod val="95000"/>
-                  </a:schemeClr>
-                </a:solidFill>
-              </a:rPr>
-              <a:t>now</a:t>
-            </a:r>
-            <a:r>
-              <a:rPr lang="de-DE" sz="2000" dirty="0">
-                <a:solidFill>
-                  <a:schemeClr val="tx1">
-                    <a:lumMod val="95000"/>
-                  </a:schemeClr>
-                </a:solidFill>
-              </a:rPr>
-              <a:t>() erstellt hat wiederum </a:t>
-            </a:r>
-            <a:r>
-              <a:rPr lang="de-DE" sz="2000" dirty="0" err="1">
-                <a:solidFill>
-                  <a:schemeClr val="tx1">
-                    <a:lumMod val="95000"/>
-                  </a:schemeClr>
-                </a:solidFill>
-              </a:rPr>
-              <a:t>methoden</a:t>
-            </a:r>
-            <a:r>
-              <a:rPr lang="de-DE" sz="2000" dirty="0">
-                <a:solidFill>
-                  <a:schemeClr val="tx1">
-                    <a:lumMod val="95000"/>
-                  </a:schemeClr>
-                </a:solidFill>
-              </a:rPr>
-              <a:t> mit denen wir die einzelnen werte wie Jahr, Monat, Tag, Stunde … ausgeben können</a:t>
-            </a:r>
-          </a:p>
-          <a:p>
-            <a:pPr lvl="1"/>
-            <a:r>
-              <a:rPr lang="de-DE" sz="2000" dirty="0">
-                <a:solidFill>
-                  <a:schemeClr val="tx1">
-                    <a:lumMod val="95000"/>
-                  </a:schemeClr>
-                </a:solidFill>
-              </a:rPr>
-              <a:t>…</a:t>
-            </a:r>
+              <a:t>  - Abstrakte Klasse um mit Zeitzonen umzugehen</a:t>
+            </a:r>
+          </a:p>
+          <a:p>
+            <a:pPr marL="457200" indent="-457200">
+              <a:buFont typeface="+mj-lt"/>
+              <a:buAutoNum type="arabicPeriod"/>
+            </a:pPr>
+            <a:endParaRPr lang="de-DE" sz="2400" dirty="0">
+              <a:solidFill>
+                <a:schemeClr val="tx1">
+                  <a:lumMod val="95000"/>
+                </a:schemeClr>
+              </a:solidFill>
+            </a:endParaRPr>
           </a:p>
           <a:p>
             <a:endParaRPr lang="de-DE" sz="2000" dirty="0">
@@ -8334,6 +9406,15 @@
               </a:solidFill>
             </a:endParaRPr>
           </a:p>
+          <a:p>
+            <a:endParaRPr lang="de-DE" sz="2000" dirty="0">
+              <a:solidFill>
+                <a:schemeClr val="tx1">
+                  <a:lumMod val="95000"/>
+                </a:schemeClr>
+              </a:solidFill>
+            </a:endParaRPr>
+          </a:p>
         </p:txBody>
       </p:sp>
       <p:sp>
@@ -8364,7 +9445,7 @@
           <a:p>
             <a:fld id="{D4AD37E9-5A10-49A7-855D-CAA2D2E848B6}" type="datetimeFigureOut">
               <a:rPr lang="de-DE" smtClean="0"/>
-              <a:t>29.07.21</a:t>
+              <a:t>18.01.2022</a:t>
             </a:fld>
             <a:endParaRPr lang="de-DE"/>
           </a:p>
@@ -8465,6 +9546,767 @@
     <p:extLst>
       <p:ext uri="{BB962C8B-B14F-4D97-AF65-F5344CB8AC3E}">
         <p14:creationId xmlns:p14="http://schemas.microsoft.com/office/powerpoint/2010/main" val="803983514"/>
+      </p:ext>
+    </p:extLst>
+  </p:cSld>
+  <p:clrMapOvr>
+    <a:masterClrMapping/>
+  </p:clrMapOvr>
+  <p:timing>
+    <p:tnLst>
+      <p:par>
+        <p:cTn id="1" dur="indefinite" restart="never" nodeType="tmRoot">
+          <p:childTnLst>
+            <p:seq concurrent="1" nextAc="seek">
+              <p:cTn id="2" dur="indefinite" nodeType="mainSeq">
+                <p:childTnLst>
+                  <p:par>
+                    <p:cTn id="3" fill="hold">
+                      <p:stCondLst>
+                        <p:cond delay="indefinite"/>
+                      </p:stCondLst>
+                      <p:childTnLst>
+                        <p:par>
+                          <p:cTn id="4" fill="hold">
+                            <p:stCondLst>
+                              <p:cond delay="0"/>
+                            </p:stCondLst>
+                            <p:childTnLst>
+                              <p:par>
+                                <p:cTn id="5" presetID="10" presetClass="entr" presetSubtype="0" fill="hold" nodeType="clickEffect">
+                                  <p:stCondLst>
+                                    <p:cond delay="0"/>
+                                  </p:stCondLst>
+                                  <p:childTnLst>
+                                    <p:set>
+                                      <p:cBhvr>
+                                        <p:cTn id="6" dur="1" fill="hold">
+                                          <p:stCondLst>
+                                            <p:cond delay="0"/>
+                                          </p:stCondLst>
+                                        </p:cTn>
+                                        <p:tgtEl>
+                                          <p:spTgt spid="6">
+                                            <p:txEl>
+                                              <p:pRg st="0" end="0"/>
+                                            </p:txEl>
+                                          </p:spTgt>
+                                        </p:tgtEl>
+                                        <p:attrNameLst>
+                                          <p:attrName>style.visibility</p:attrName>
+                                        </p:attrNameLst>
+                                      </p:cBhvr>
+                                      <p:to>
+                                        <p:strVal val="visible"/>
+                                      </p:to>
+                                    </p:set>
+                                    <p:animEffect transition="in" filter="fade">
+                                      <p:cBhvr>
+                                        <p:cTn id="7" dur="500"/>
+                                        <p:tgtEl>
+                                          <p:spTgt spid="6">
+                                            <p:txEl>
+                                              <p:pRg st="0" end="0"/>
+                                            </p:txEl>
+                                          </p:spTgt>
+                                        </p:tgtEl>
+                                      </p:cBhvr>
+                                    </p:animEffect>
+                                  </p:childTnLst>
+                                </p:cTn>
+                              </p:par>
+                            </p:childTnLst>
+                          </p:cTn>
+                        </p:par>
+                      </p:childTnLst>
+                    </p:cTn>
+                  </p:par>
+                  <p:par>
+                    <p:cTn id="8" fill="hold">
+                      <p:stCondLst>
+                        <p:cond delay="indefinite"/>
+                      </p:stCondLst>
+                      <p:childTnLst>
+                        <p:par>
+                          <p:cTn id="9" fill="hold">
+                            <p:stCondLst>
+                              <p:cond delay="0"/>
+                            </p:stCondLst>
+                            <p:childTnLst>
+                              <p:par>
+                                <p:cTn id="10" presetID="10" presetClass="entr" presetSubtype="0" fill="hold" nodeType="clickEffect">
+                                  <p:stCondLst>
+                                    <p:cond delay="0"/>
+                                  </p:stCondLst>
+                                  <p:childTnLst>
+                                    <p:set>
+                                      <p:cBhvr>
+                                        <p:cTn id="11" dur="1" fill="hold">
+                                          <p:stCondLst>
+                                            <p:cond delay="0"/>
+                                          </p:stCondLst>
+                                        </p:cTn>
+                                        <p:tgtEl>
+                                          <p:spTgt spid="6">
+                                            <p:txEl>
+                                              <p:pRg st="2" end="2"/>
+                                            </p:txEl>
+                                          </p:spTgt>
+                                        </p:tgtEl>
+                                        <p:attrNameLst>
+                                          <p:attrName>style.visibility</p:attrName>
+                                        </p:attrNameLst>
+                                      </p:cBhvr>
+                                      <p:to>
+                                        <p:strVal val="visible"/>
+                                      </p:to>
+                                    </p:set>
+                                    <p:animEffect transition="in" filter="fade">
+                                      <p:cBhvr>
+                                        <p:cTn id="12" dur="500"/>
+                                        <p:tgtEl>
+                                          <p:spTgt spid="6">
+                                            <p:txEl>
+                                              <p:pRg st="2" end="2"/>
+                                            </p:txEl>
+                                          </p:spTgt>
+                                        </p:tgtEl>
+                                      </p:cBhvr>
+                                    </p:animEffect>
+                                  </p:childTnLst>
+                                </p:cTn>
+                              </p:par>
+                            </p:childTnLst>
+                          </p:cTn>
+                        </p:par>
+                      </p:childTnLst>
+                    </p:cTn>
+                  </p:par>
+                  <p:par>
+                    <p:cTn id="13" fill="hold">
+                      <p:stCondLst>
+                        <p:cond delay="indefinite"/>
+                      </p:stCondLst>
+                      <p:childTnLst>
+                        <p:par>
+                          <p:cTn id="14" fill="hold">
+                            <p:stCondLst>
+                              <p:cond delay="0"/>
+                            </p:stCondLst>
+                            <p:childTnLst>
+                              <p:par>
+                                <p:cTn id="15" presetID="10" presetClass="entr" presetSubtype="0" fill="hold" nodeType="clickEffect">
+                                  <p:stCondLst>
+                                    <p:cond delay="0"/>
+                                  </p:stCondLst>
+                                  <p:childTnLst>
+                                    <p:set>
+                                      <p:cBhvr>
+                                        <p:cTn id="16" dur="1" fill="hold">
+                                          <p:stCondLst>
+                                            <p:cond delay="0"/>
+                                          </p:stCondLst>
+                                        </p:cTn>
+                                        <p:tgtEl>
+                                          <p:spTgt spid="6">
+                                            <p:txEl>
+                                              <p:pRg st="3" end="3"/>
+                                            </p:txEl>
+                                          </p:spTgt>
+                                        </p:tgtEl>
+                                        <p:attrNameLst>
+                                          <p:attrName>style.visibility</p:attrName>
+                                        </p:attrNameLst>
+                                      </p:cBhvr>
+                                      <p:to>
+                                        <p:strVal val="visible"/>
+                                      </p:to>
+                                    </p:set>
+                                    <p:animEffect transition="in" filter="fade">
+                                      <p:cBhvr>
+                                        <p:cTn id="17" dur="500"/>
+                                        <p:tgtEl>
+                                          <p:spTgt spid="6">
+                                            <p:txEl>
+                                              <p:pRg st="3" end="3"/>
+                                            </p:txEl>
+                                          </p:spTgt>
+                                        </p:tgtEl>
+                                      </p:cBhvr>
+                                    </p:animEffect>
+                                  </p:childTnLst>
+                                </p:cTn>
+                              </p:par>
+                            </p:childTnLst>
+                          </p:cTn>
+                        </p:par>
+                      </p:childTnLst>
+                    </p:cTn>
+                  </p:par>
+                  <p:par>
+                    <p:cTn id="18" fill="hold">
+                      <p:stCondLst>
+                        <p:cond delay="indefinite"/>
+                      </p:stCondLst>
+                      <p:childTnLst>
+                        <p:par>
+                          <p:cTn id="19" fill="hold">
+                            <p:stCondLst>
+                              <p:cond delay="0"/>
+                            </p:stCondLst>
+                            <p:childTnLst>
+                              <p:par>
+                                <p:cTn id="20" presetID="10" presetClass="entr" presetSubtype="0" fill="hold" nodeType="clickEffect">
+                                  <p:stCondLst>
+                                    <p:cond delay="0"/>
+                                  </p:stCondLst>
+                                  <p:childTnLst>
+                                    <p:set>
+                                      <p:cBhvr>
+                                        <p:cTn id="21" dur="1" fill="hold">
+                                          <p:stCondLst>
+                                            <p:cond delay="0"/>
+                                          </p:stCondLst>
+                                        </p:cTn>
+                                        <p:tgtEl>
+                                          <p:spTgt spid="6">
+                                            <p:txEl>
+                                              <p:pRg st="4" end="4"/>
+                                            </p:txEl>
+                                          </p:spTgt>
+                                        </p:tgtEl>
+                                        <p:attrNameLst>
+                                          <p:attrName>style.visibility</p:attrName>
+                                        </p:attrNameLst>
+                                      </p:cBhvr>
+                                      <p:to>
+                                        <p:strVal val="visible"/>
+                                      </p:to>
+                                    </p:set>
+                                    <p:animEffect transition="in" filter="fade">
+                                      <p:cBhvr>
+                                        <p:cTn id="22" dur="500"/>
+                                        <p:tgtEl>
+                                          <p:spTgt spid="6">
+                                            <p:txEl>
+                                              <p:pRg st="4" end="4"/>
+                                            </p:txEl>
+                                          </p:spTgt>
+                                        </p:tgtEl>
+                                      </p:cBhvr>
+                                    </p:animEffect>
+                                  </p:childTnLst>
+                                </p:cTn>
+                              </p:par>
+                            </p:childTnLst>
+                          </p:cTn>
+                        </p:par>
+                      </p:childTnLst>
+                    </p:cTn>
+                  </p:par>
+                  <p:par>
+                    <p:cTn id="23" fill="hold">
+                      <p:stCondLst>
+                        <p:cond delay="indefinite"/>
+                      </p:stCondLst>
+                      <p:childTnLst>
+                        <p:par>
+                          <p:cTn id="24" fill="hold">
+                            <p:stCondLst>
+                              <p:cond delay="0"/>
+                            </p:stCondLst>
+                            <p:childTnLst>
+                              <p:par>
+                                <p:cTn id="25" presetID="10" presetClass="entr" presetSubtype="0" fill="hold" nodeType="clickEffect">
+                                  <p:stCondLst>
+                                    <p:cond delay="0"/>
+                                  </p:stCondLst>
+                                  <p:childTnLst>
+                                    <p:set>
+                                      <p:cBhvr>
+                                        <p:cTn id="26" dur="1" fill="hold">
+                                          <p:stCondLst>
+                                            <p:cond delay="0"/>
+                                          </p:stCondLst>
+                                        </p:cTn>
+                                        <p:tgtEl>
+                                          <p:spTgt spid="6">
+                                            <p:txEl>
+                                              <p:pRg st="5" end="5"/>
+                                            </p:txEl>
+                                          </p:spTgt>
+                                        </p:tgtEl>
+                                        <p:attrNameLst>
+                                          <p:attrName>style.visibility</p:attrName>
+                                        </p:attrNameLst>
+                                      </p:cBhvr>
+                                      <p:to>
+                                        <p:strVal val="visible"/>
+                                      </p:to>
+                                    </p:set>
+                                    <p:animEffect transition="in" filter="fade">
+                                      <p:cBhvr>
+                                        <p:cTn id="27" dur="500"/>
+                                        <p:tgtEl>
+                                          <p:spTgt spid="6">
+                                            <p:txEl>
+                                              <p:pRg st="5" end="5"/>
+                                            </p:txEl>
+                                          </p:spTgt>
+                                        </p:tgtEl>
+                                      </p:cBhvr>
+                                    </p:animEffect>
+                                  </p:childTnLst>
+                                </p:cTn>
+                              </p:par>
+                            </p:childTnLst>
+                          </p:cTn>
+                        </p:par>
+                      </p:childTnLst>
+                    </p:cTn>
+                  </p:par>
+                  <p:par>
+                    <p:cTn id="28" fill="hold">
+                      <p:stCondLst>
+                        <p:cond delay="indefinite"/>
+                      </p:stCondLst>
+                      <p:childTnLst>
+                        <p:par>
+                          <p:cTn id="29" fill="hold">
+                            <p:stCondLst>
+                              <p:cond delay="0"/>
+                            </p:stCondLst>
+                            <p:childTnLst>
+                              <p:par>
+                                <p:cTn id="30" presetID="10" presetClass="entr" presetSubtype="0" fill="hold" nodeType="clickEffect">
+                                  <p:stCondLst>
+                                    <p:cond delay="0"/>
+                                  </p:stCondLst>
+                                  <p:childTnLst>
+                                    <p:set>
+                                      <p:cBhvr>
+                                        <p:cTn id="31" dur="1" fill="hold">
+                                          <p:stCondLst>
+                                            <p:cond delay="0"/>
+                                          </p:stCondLst>
+                                        </p:cTn>
+                                        <p:tgtEl>
+                                          <p:spTgt spid="6">
+                                            <p:txEl>
+                                              <p:pRg st="6" end="6"/>
+                                            </p:txEl>
+                                          </p:spTgt>
+                                        </p:tgtEl>
+                                        <p:attrNameLst>
+                                          <p:attrName>style.visibility</p:attrName>
+                                        </p:attrNameLst>
+                                      </p:cBhvr>
+                                      <p:to>
+                                        <p:strVal val="visible"/>
+                                      </p:to>
+                                    </p:set>
+                                    <p:animEffect transition="in" filter="fade">
+                                      <p:cBhvr>
+                                        <p:cTn id="32" dur="500"/>
+                                        <p:tgtEl>
+                                          <p:spTgt spid="6">
+                                            <p:txEl>
+                                              <p:pRg st="6" end="6"/>
+                                            </p:txEl>
+                                          </p:spTgt>
+                                        </p:tgtEl>
+                                      </p:cBhvr>
+                                    </p:animEffect>
+                                  </p:childTnLst>
+                                </p:cTn>
+                              </p:par>
+                            </p:childTnLst>
+                          </p:cTn>
+                        </p:par>
+                      </p:childTnLst>
+                    </p:cTn>
+                  </p:par>
+                </p:childTnLst>
+              </p:cTn>
+              <p:prevCondLst>
+                <p:cond evt="onPrev" delay="0">
+                  <p:tgtEl>
+                    <p:sldTgt/>
+                  </p:tgtEl>
+                </p:cond>
+              </p:prevCondLst>
+              <p:nextCondLst>
+                <p:cond evt="onNext" delay="0">
+                  <p:tgtEl>
+                    <p:sldTgt/>
+                  </p:tgtEl>
+                </p:cond>
+              </p:nextCondLst>
+            </p:seq>
+          </p:childTnLst>
+        </p:cTn>
+      </p:par>
+    </p:tnLst>
+  </p:timing>
+</p:sld>
+</file>
+
+<file path=ppt/slides/slide5.xml><?xml version="1.0" encoding="utf-8"?>
+<p:sld xmlns:a="http://schemas.openxmlformats.org/drawingml/2006/main" xmlns:r="http://schemas.openxmlformats.org/officeDocument/2006/relationships" xmlns:p="http://schemas.openxmlformats.org/presentationml/2006/main">
+  <p:cSld>
+    <p:spTree>
+      <p:nvGrpSpPr>
+        <p:cNvPr id="1" name=""/>
+        <p:cNvGrpSpPr/>
+        <p:nvPr/>
+      </p:nvGrpSpPr>
+      <p:grpSpPr>
+        <a:xfrm>
+          <a:off x="0" y="0"/>
+          <a:ext cx="0" cy="0"/>
+          <a:chOff x="0" y="0"/>
+          <a:chExt cx="0" cy="0"/>
+        </a:xfrm>
+      </p:grpSpPr>
+      <p:sp>
+        <p:nvSpPr>
+          <p:cNvPr id="5" name="Titel 4">
+            <a:extLst>
+              <a:ext uri="{FF2B5EF4-FFF2-40B4-BE49-F238E27FC236}">
+                <a16:creationId xmlns:a16="http://schemas.microsoft.com/office/drawing/2014/main" id="{BDF2C912-E02F-4E1F-82DF-351A88BA5B31}"/>
+              </a:ext>
+            </a:extLst>
+          </p:cNvPr>
+          <p:cNvSpPr>
+            <a:spLocks noGrp="1"/>
+          </p:cNvSpPr>
+          <p:nvPr>
+            <p:ph type="title"/>
+          </p:nvPr>
+        </p:nvSpPr>
+        <p:spPr>
+          <a:xfrm>
+            <a:off x="838200" y="365125"/>
+            <a:ext cx="7958667" cy="1137104"/>
+          </a:xfrm>
+        </p:spPr>
+        <p:txBody>
+          <a:bodyPr anchor="b">
+            <a:normAutofit/>
+          </a:bodyPr>
+          <a:lstStyle/>
+          <a:p>
+            <a:r>
+              <a:rPr lang="de-DE" sz="4400" dirty="0">
+                <a:solidFill>
+                  <a:schemeClr val="tx1">
+                    <a:lumMod val="95000"/>
+                  </a:schemeClr>
+                </a:solidFill>
+              </a:rPr>
+              <a:t>date</a:t>
+            </a:r>
+          </a:p>
+        </p:txBody>
+      </p:sp>
+      <p:sp>
+        <p:nvSpPr>
+          <p:cNvPr id="6" name="Inhaltsplatzhalter 5">
+            <a:extLst>
+              <a:ext uri="{FF2B5EF4-FFF2-40B4-BE49-F238E27FC236}">
+                <a16:creationId xmlns:a16="http://schemas.microsoft.com/office/drawing/2014/main" id="{67FD4DD5-46C1-4974-A569-BB95F27DCC4F}"/>
+              </a:ext>
+            </a:extLst>
+          </p:cNvPr>
+          <p:cNvSpPr>
+            <a:spLocks noGrp="1"/>
+          </p:cNvSpPr>
+          <p:nvPr>
+            <p:ph idx="1"/>
+          </p:nvPr>
+        </p:nvSpPr>
+        <p:spPr>
+          <a:xfrm>
+            <a:off x="838201" y="1825625"/>
+            <a:ext cx="7958666" cy="4351338"/>
+          </a:xfrm>
+        </p:spPr>
+        <p:txBody>
+          <a:bodyPr>
+            <a:normAutofit/>
+          </a:bodyPr>
+          <a:lstStyle/>
+          <a:p>
+            <a:r>
+              <a:rPr lang="de-DE" sz="2400" dirty="0">
+                <a:solidFill>
+                  <a:schemeClr val="tx1">
+                    <a:lumMod val="95000"/>
+                  </a:schemeClr>
+                </a:solidFill>
+              </a:rPr>
+              <a:t>Mit date kann man das Datum ausgeben</a:t>
+            </a:r>
+          </a:p>
+          <a:p>
+            <a:pPr lvl="1"/>
+            <a:r>
+              <a:rPr lang="de-DE" sz="2000" dirty="0" err="1">
+                <a:solidFill>
+                  <a:schemeClr val="tx1">
+                    <a:lumMod val="95000"/>
+                  </a:schemeClr>
+                </a:solidFill>
+              </a:rPr>
+              <a:t>today</a:t>
+            </a:r>
+            <a:r>
+              <a:rPr lang="de-DE" sz="2000" dirty="0">
+                <a:solidFill>
+                  <a:schemeClr val="tx1">
+                    <a:lumMod val="95000"/>
+                  </a:schemeClr>
+                </a:solidFill>
+              </a:rPr>
+              <a:t>()</a:t>
+            </a:r>
+          </a:p>
+          <a:p>
+            <a:pPr lvl="2"/>
+            <a:r>
+              <a:rPr lang="de-DE" sz="1600" dirty="0">
+                <a:solidFill>
+                  <a:schemeClr val="tx1">
+                    <a:lumMod val="95000"/>
+                  </a:schemeClr>
+                </a:solidFill>
+              </a:rPr>
+              <a:t>Gibt uns das Aktuelle Datum</a:t>
+            </a:r>
+          </a:p>
+          <a:p>
+            <a:pPr lvl="1"/>
+            <a:r>
+              <a:rPr lang="de-DE" sz="2000" dirty="0">
+                <a:solidFill>
+                  <a:schemeClr val="tx1">
+                    <a:lumMod val="95000"/>
+                  </a:schemeClr>
+                </a:solidFill>
+              </a:rPr>
+              <a:t>Das date Objekt das mit </a:t>
+            </a:r>
+            <a:r>
+              <a:rPr lang="de-DE" sz="2000" dirty="0" err="1">
+                <a:solidFill>
+                  <a:schemeClr val="tx1">
+                    <a:lumMod val="95000"/>
+                  </a:schemeClr>
+                </a:solidFill>
+              </a:rPr>
+              <a:t>now</a:t>
+            </a:r>
+            <a:r>
+              <a:rPr lang="de-DE" sz="2000" dirty="0">
+                <a:solidFill>
+                  <a:schemeClr val="tx1">
+                    <a:lumMod val="95000"/>
+                  </a:schemeClr>
+                </a:solidFill>
+              </a:rPr>
+              <a:t>() erstellt wird, hat wiederum </a:t>
+            </a:r>
+            <a:r>
+              <a:rPr lang="de-DE" sz="2000" dirty="0" err="1">
+                <a:solidFill>
+                  <a:schemeClr val="tx1">
+                    <a:lumMod val="95000"/>
+                  </a:schemeClr>
+                </a:solidFill>
+              </a:rPr>
+              <a:t>methoden</a:t>
+            </a:r>
+            <a:r>
+              <a:rPr lang="de-DE" sz="2000" dirty="0">
+                <a:solidFill>
+                  <a:schemeClr val="tx1">
+                    <a:lumMod val="95000"/>
+                  </a:schemeClr>
+                </a:solidFill>
+              </a:rPr>
+              <a:t> mit denen wir die einzelnen werte wie Jahr, Monat, Tag sowie die Wochentage </a:t>
+            </a:r>
+            <a:r>
+              <a:rPr lang="de-DE" sz="2000">
+                <a:solidFill>
+                  <a:schemeClr val="tx1">
+                    <a:lumMod val="95000"/>
+                  </a:schemeClr>
+                </a:solidFill>
+              </a:rPr>
+              <a:t>ausgeben können.</a:t>
+            </a:r>
+            <a:endParaRPr lang="de-DE" sz="2000" dirty="0">
+              <a:solidFill>
+                <a:schemeClr val="tx1">
+                  <a:lumMod val="95000"/>
+                </a:schemeClr>
+              </a:solidFill>
+            </a:endParaRPr>
+          </a:p>
+          <a:p>
+            <a:pPr lvl="1"/>
+            <a:r>
+              <a:rPr lang="de-DE" sz="2000" dirty="0">
+                <a:solidFill>
+                  <a:schemeClr val="tx1">
+                    <a:lumMod val="95000"/>
+                  </a:schemeClr>
+                </a:solidFill>
+              </a:rPr>
+              <a:t>…</a:t>
+            </a:r>
+          </a:p>
+          <a:p>
+            <a:endParaRPr lang="de-DE" sz="2000" dirty="0">
+              <a:solidFill>
+                <a:schemeClr val="tx1">
+                  <a:lumMod val="95000"/>
+                </a:schemeClr>
+              </a:solidFill>
+            </a:endParaRPr>
+          </a:p>
+        </p:txBody>
+      </p:sp>
+      <p:sp>
+        <p:nvSpPr>
+          <p:cNvPr id="7" name="Date Placeholder 3">
+            <a:extLst>
+              <a:ext uri="{FF2B5EF4-FFF2-40B4-BE49-F238E27FC236}">
+                <a16:creationId xmlns:a16="http://schemas.microsoft.com/office/drawing/2014/main" id="{18705B3C-262D-45A3-8C90-9FC26244A8CC}"/>
+              </a:ext>
+            </a:extLst>
+          </p:cNvPr>
+          <p:cNvSpPr>
+            <a:spLocks noGrp="1"/>
+          </p:cNvSpPr>
+          <p:nvPr>
+            <p:ph type="dt" sz="half" idx="10"/>
+          </p:nvPr>
+        </p:nvSpPr>
+        <p:spPr>
+          <a:xfrm>
+            <a:off x="838200" y="6356350"/>
+            <a:ext cx="2743200" cy="365125"/>
+          </a:xfrm>
+        </p:spPr>
+        <p:txBody>
+          <a:bodyPr/>
+          <a:lstStyle/>
+          <a:p>
+            <a:fld id="{D4AD37E9-5A10-49A7-855D-CAA2D2E848B6}" type="datetimeFigureOut">
+              <a:rPr lang="de-DE" smtClean="0"/>
+              <a:t>18.01.2022</a:t>
+            </a:fld>
+            <a:endParaRPr lang="de-DE"/>
+          </a:p>
+        </p:txBody>
+      </p:sp>
+      <p:sp>
+        <p:nvSpPr>
+          <p:cNvPr id="8" name="Footer Placeholder 4">
+            <a:extLst>
+              <a:ext uri="{FF2B5EF4-FFF2-40B4-BE49-F238E27FC236}">
+                <a16:creationId xmlns:a16="http://schemas.microsoft.com/office/drawing/2014/main" id="{6833897F-8945-43C1-8EE1-2E83FF8331D9}"/>
+              </a:ext>
+            </a:extLst>
+          </p:cNvPr>
+          <p:cNvSpPr>
+            <a:spLocks noGrp="1"/>
+          </p:cNvSpPr>
+          <p:nvPr>
+            <p:ph type="ftr" sz="quarter" idx="11"/>
+          </p:nvPr>
+        </p:nvSpPr>
+        <p:spPr>
+          <a:xfrm>
+            <a:off x="4038600" y="6356350"/>
+            <a:ext cx="4114800" cy="365125"/>
+          </a:xfrm>
+        </p:spPr>
+        <p:txBody>
+          <a:bodyPr/>
+          <a:lstStyle/>
+          <a:p>
+            <a:r>
+              <a:rPr lang="de-DE" sz="1200" dirty="0" err="1">
+                <a:solidFill>
+                  <a:schemeClr val="tx1">
+                    <a:lumMod val="95000"/>
+                  </a:schemeClr>
+                </a:solidFill>
+              </a:rPr>
+              <a:t>Datetime</a:t>
+            </a:r>
+            <a:r>
+              <a:rPr lang="de-DE" sz="1200" dirty="0">
+                <a:solidFill>
+                  <a:schemeClr val="tx1">
+                    <a:lumMod val="95000"/>
+                  </a:schemeClr>
+                </a:solidFill>
+              </a:rPr>
+              <a:t> </a:t>
+            </a:r>
+            <a:endParaRPr lang="en-US" sz="1200" dirty="0">
+              <a:solidFill>
+                <a:schemeClr val="tx1">
+                  <a:lumMod val="95000"/>
+                </a:schemeClr>
+              </a:solidFill>
+              <a:latin typeface="+mj-lt"/>
+            </a:endParaRPr>
+          </a:p>
+        </p:txBody>
+      </p:sp>
+      <p:sp>
+        <p:nvSpPr>
+          <p:cNvPr id="9" name="Slide Number Placeholder 5">
+            <a:extLst>
+              <a:ext uri="{FF2B5EF4-FFF2-40B4-BE49-F238E27FC236}">
+                <a16:creationId xmlns:a16="http://schemas.microsoft.com/office/drawing/2014/main" id="{4CB1546C-41E9-4CE9-A31D-18CB078FE5F0}"/>
+              </a:ext>
+            </a:extLst>
+          </p:cNvPr>
+          <p:cNvSpPr>
+            <a:spLocks noGrp="1"/>
+          </p:cNvSpPr>
+          <p:nvPr>
+            <p:ph type="sldNum" sz="quarter" idx="12"/>
+          </p:nvPr>
+        </p:nvSpPr>
+        <p:spPr>
+          <a:xfrm>
+            <a:off x="8610600" y="6356350"/>
+            <a:ext cx="2743200" cy="365125"/>
+          </a:xfrm>
+        </p:spPr>
+        <p:txBody>
+          <a:bodyPr/>
+          <a:lstStyle/>
+          <a:p>
+            <a:fld id="{312A73BE-F097-4DBB-AEB2-4CC070160BA0}" type="slidenum">
+              <a:rPr lang="de-DE" smtClean="0"/>
+              <a:t>5</a:t>
+            </a:fld>
+            <a:endParaRPr lang="de-DE"/>
+          </a:p>
+        </p:txBody>
+      </p:sp>
+    </p:spTree>
+    <p:extLst>
+      <p:ext uri="{BB962C8B-B14F-4D97-AF65-F5344CB8AC3E}">
+        <p14:creationId xmlns:p14="http://schemas.microsoft.com/office/powerpoint/2010/main" val="2427604796"/>
       </p:ext>
     </p:extLst>
   </p:cSld>
@@ -8809,7 +10651,7 @@
 </p:sld>
 </file>
 
-<file path=ppt/slides/slide5.xml><?xml version="1.0" encoding="utf-8"?>
+<file path=ppt/slides/slide6.xml><?xml version="1.0" encoding="utf-8"?>
 <p:sld xmlns:a="http://schemas.openxmlformats.org/drawingml/2006/main" xmlns:r="http://schemas.openxmlformats.org/officeDocument/2006/relationships" xmlns:p="http://schemas.openxmlformats.org/presentationml/2006/main">
   <p:cSld>
     <p:spTree>
@@ -8862,27 +10704,7 @@
                   </a:schemeClr>
                 </a:solidFill>
               </a:rPr>
-              <a:t>Was kann </a:t>
-            </a:r>
-            <a:r>
-              <a:rPr lang="de-DE" sz="4400" dirty="0" err="1">
-                <a:solidFill>
-                  <a:schemeClr val="tx1">
-                    <a:lumMod val="95000"/>
-                  </a:schemeClr>
-                </a:solidFill>
-              </a:rPr>
-              <a:t>strftime</a:t>
-            </a:r>
-            <a:r>
-              <a:rPr lang="de-DE" sz="4400" dirty="0">
-                <a:solidFill>
-                  <a:schemeClr val="tx1">
-                    <a:lumMod val="95000"/>
-                  </a:schemeClr>
-                </a:solidFill>
-              </a:rPr>
-              <a:t> ?</a:t>
+              <a:t>time</a:t>
             </a:r>
           </a:p>
         </p:txBody>
@@ -8916,16 +10738,6 @@
           <a:lstStyle/>
           <a:p>
             <a:r>
-              <a:rPr lang="de-DE" sz="2400" dirty="0" err="1">
-                <a:solidFill>
-                  <a:schemeClr val="tx1">
-                    <a:lumMod val="95000"/>
-                  </a:schemeClr>
-                </a:solidFill>
-              </a:rPr>
-              <a:t>strftime</a:t>
-            </a:r>
-            <a:r>
               <a:rPr lang="de-DE" sz="2400" dirty="0">
                 <a:solidFill>
                   <a:schemeClr val="tx1">
@@ -8933,93 +10745,10 @@
                   </a:schemeClr>
                 </a:solidFill>
               </a:rPr>
-              <a:t> wird verwendet um aus einem </a:t>
-            </a:r>
-            <a:r>
-              <a:rPr lang="de-DE" sz="2400" dirty="0" err="1">
-                <a:solidFill>
-                  <a:schemeClr val="tx1">
-                    <a:lumMod val="95000"/>
-                  </a:schemeClr>
-                </a:solidFill>
-              </a:rPr>
-              <a:t>datetime</a:t>
-            </a:r>
-            <a:r>
-              <a:rPr lang="de-DE" sz="2400" dirty="0">
-                <a:solidFill>
-                  <a:schemeClr val="tx1">
-                    <a:lumMod val="95000"/>
-                  </a:schemeClr>
-                </a:solidFill>
-              </a:rPr>
-              <a:t>-Objekt einen String zu erstellen</a:t>
-            </a:r>
-          </a:p>
-          <a:p>
-            <a:r>
-              <a:rPr lang="de-DE" sz="2400" dirty="0">
-                <a:solidFill>
-                  <a:schemeClr val="tx1">
-                    <a:lumMod val="95000"/>
-                  </a:schemeClr>
-                </a:solidFill>
-              </a:rPr>
-              <a:t>Die </a:t>
-            </a:r>
-            <a:r>
-              <a:rPr lang="de-DE" sz="2400" dirty="0" err="1">
-                <a:solidFill>
-                  <a:schemeClr val="tx1">
-                    <a:lumMod val="95000"/>
-                  </a:schemeClr>
-                </a:solidFill>
-              </a:rPr>
-              <a:t>strftime</a:t>
-            </a:r>
-            <a:r>
-              <a:rPr lang="de-DE" sz="2400" dirty="0">
-                <a:solidFill>
-                  <a:schemeClr val="tx1">
-                    <a:lumMod val="95000"/>
-                  </a:schemeClr>
-                </a:solidFill>
-              </a:rPr>
-              <a:t>()-Methode benötigt einen Formatierungscode </a:t>
-            </a:r>
-          </a:p>
-          <a:p>
-            <a:pPr lvl="1"/>
-            <a:r>
-              <a:rPr lang="de-DE" sz="2000" dirty="0" err="1">
-                <a:solidFill>
-                  <a:schemeClr val="tx1">
-                    <a:lumMod val="95000"/>
-                  </a:schemeClr>
-                </a:solidFill>
-              </a:rPr>
-              <a:t>dd</a:t>
-            </a:r>
-            <a:r>
-              <a:rPr lang="de-DE" sz="2000" dirty="0">
-                <a:solidFill>
-                  <a:schemeClr val="tx1">
-                    <a:lumMod val="95000"/>
-                  </a:schemeClr>
-                </a:solidFill>
-              </a:rPr>
-              <a:t>/mm/</a:t>
-            </a:r>
-            <a:r>
-              <a:rPr lang="de-DE" sz="2000" dirty="0" err="1">
-                <a:solidFill>
-                  <a:schemeClr val="tx1">
-                    <a:lumMod val="95000"/>
-                  </a:schemeClr>
-                </a:solidFill>
-              </a:rPr>
-              <a:t>yyyy</a:t>
-            </a:r>
+              <a:t>Mit time werden Zeit Berechnungen durchgeführt, oder die Programm Ausführung angehalten</a:t>
+            </a:r>
+          </a:p>
+          <a:p>
             <a:endParaRPr lang="de-DE" sz="2000" dirty="0">
               <a:solidFill>
                 <a:schemeClr val="tx1">
@@ -9031,119 +10760,81 @@
           <a:p>
             <a:pPr lvl="1"/>
             <a:r>
-              <a:rPr lang="de-DE" sz="2000" dirty="0" err="1">
-                <a:solidFill>
-                  <a:schemeClr val="tx1">
-                    <a:lumMod val="95000"/>
-                  </a:schemeClr>
-                </a:solidFill>
-              </a:rPr>
-              <a:t>yyyy</a:t>
-            </a:r>
-            <a:r>
-              <a:rPr lang="de-DE" sz="2000" dirty="0">
-                <a:solidFill>
-                  <a:schemeClr val="tx1">
-                    <a:lumMod val="95000"/>
-                  </a:schemeClr>
-                </a:solidFill>
-              </a:rPr>
-              <a:t>/</a:t>
-            </a:r>
-            <a:r>
-              <a:rPr lang="de-DE" sz="2000" dirty="0" err="1">
-                <a:solidFill>
-                  <a:schemeClr val="tx1">
-                    <a:lumMod val="95000"/>
-                  </a:schemeClr>
-                </a:solidFill>
-              </a:rPr>
-              <a:t>dd</a:t>
-            </a:r>
-            <a:r>
-              <a:rPr lang="de-DE" sz="2000" dirty="0">
-                <a:solidFill>
-                  <a:schemeClr val="tx1">
-                    <a:lumMod val="95000"/>
-                  </a:schemeClr>
-                </a:solidFill>
-              </a:rPr>
-              <a:t>/mm</a:t>
+              <a:rPr lang="de-DE" sz="1600" dirty="0">
+                <a:solidFill>
+                  <a:schemeClr val="tx1">
+                    <a:lumMod val="95000"/>
+                  </a:schemeClr>
+                </a:solidFill>
+              </a:rPr>
+              <a:t>Zeit in Sekunden anzeigen</a:t>
             </a:r>
           </a:p>
           <a:p>
             <a:pPr lvl="1"/>
             <a:r>
-              <a:rPr lang="de-DE" sz="2000" dirty="0" err="1">
-                <a:solidFill>
-                  <a:schemeClr val="tx1">
-                    <a:lumMod val="95000"/>
-                  </a:schemeClr>
-                </a:solidFill>
-              </a:rPr>
-              <a:t>dd</a:t>
-            </a:r>
-            <a:r>
-              <a:rPr lang="de-DE" sz="2000" dirty="0">
-                <a:solidFill>
-                  <a:schemeClr val="tx1">
-                    <a:lumMod val="95000"/>
-                  </a:schemeClr>
-                </a:solidFill>
-              </a:rPr>
-              <a:t>/mm/</a:t>
-            </a:r>
-            <a:r>
-              <a:rPr lang="de-DE" sz="2000" dirty="0" err="1">
-                <a:solidFill>
-                  <a:schemeClr val="tx1">
-                    <a:lumMod val="95000"/>
-                  </a:schemeClr>
-                </a:solidFill>
-              </a:rPr>
-              <a:t>yyyy</a:t>
-            </a:r>
-            <a:r>
-              <a:rPr lang="de-DE" sz="2000" dirty="0">
-                <a:solidFill>
-                  <a:schemeClr val="tx1">
-                    <a:lumMod val="95000"/>
-                  </a:schemeClr>
-                </a:solidFill>
-              </a:rPr>
-              <a:t> H:M:S</a:t>
-            </a:r>
-            <a:endParaRPr lang="de-DE" sz="2000" b="1" dirty="0">
-              <a:solidFill>
-                <a:schemeClr val="tx1">
-                  <a:lumMod val="95000"/>
-                </a:schemeClr>
-              </a:solidFill>
-            </a:endParaRPr>
-          </a:p>
-          <a:p>
-            <a:pPr marL="457200" lvl="1" indent="0">
-              <a:buNone/>
-            </a:pPr>
-            <a:r>
-              <a:rPr lang="de-DE" sz="1200" dirty="0">
-                <a:solidFill>
-                  <a:schemeClr val="tx1">
-                    <a:lumMod val="95000"/>
-                  </a:schemeClr>
-                </a:solidFill>
-              </a:rPr>
-              <a:t>…</a:t>
-            </a:r>
-          </a:p>
-          <a:p>
-            <a:endParaRPr lang="de-DE" sz="2000" dirty="0">
-              <a:solidFill>
-                <a:schemeClr val="tx1">
-                  <a:lumMod val="95000"/>
-                </a:schemeClr>
-              </a:solidFill>
-            </a:endParaRPr>
+              <a:rPr lang="de-DE" sz="1600" dirty="0">
+                <a:solidFill>
+                  <a:schemeClr val="tx1">
+                    <a:lumMod val="95000"/>
+                  </a:schemeClr>
+                </a:solidFill>
+              </a:rPr>
+              <a:t>Zeitwerte umwandeln (GMT, </a:t>
+            </a:r>
+            <a:r>
+              <a:rPr lang="de-DE" sz="1600" dirty="0" err="1">
+                <a:solidFill>
+                  <a:schemeClr val="tx1">
+                    <a:lumMod val="95000"/>
+                  </a:schemeClr>
+                </a:solidFill>
+              </a:rPr>
+              <a:t>Localtime</a:t>
+            </a:r>
+            <a:r>
+              <a:rPr lang="de-DE" sz="1600" dirty="0">
+                <a:solidFill>
+                  <a:schemeClr val="tx1">
+                    <a:lumMod val="95000"/>
+                  </a:schemeClr>
+                </a:solidFill>
+              </a:rPr>
+              <a:t>)</a:t>
+            </a:r>
+          </a:p>
+          <a:p>
+            <a:pPr lvl="1"/>
+            <a:r>
+              <a:rPr lang="de-DE" sz="1600" dirty="0">
+                <a:solidFill>
+                  <a:schemeClr val="tx1">
+                    <a:lumMod val="95000"/>
+                  </a:schemeClr>
+                </a:solidFill>
+              </a:rPr>
+              <a:t>Programmausführung mit „</a:t>
+            </a:r>
+            <a:r>
+              <a:rPr lang="de-DE" sz="1600" dirty="0" err="1">
+                <a:solidFill>
+                  <a:schemeClr val="tx1">
+                    <a:lumMod val="95000"/>
+                  </a:schemeClr>
+                </a:solidFill>
+              </a:rPr>
+              <a:t>sleep</a:t>
+            </a:r>
+            <a:r>
+              <a:rPr lang="de-DE" sz="1600" dirty="0">
+                <a:solidFill>
+                  <a:schemeClr val="tx1">
+                    <a:lumMod val="95000"/>
+                  </a:schemeClr>
+                </a:solidFill>
+              </a:rPr>
+              <a:t>“ pausieren</a:t>
+            </a:r>
           </a:p>
         </p:txBody>
       </p:sp>
@@ -9175,7 +10866,7 @@
           <a:p>
             <a:fld id="{D4AD37E9-5A10-49A7-855D-CAA2D2E848B6}" type="datetimeFigureOut">
               <a:rPr lang="de-DE" smtClean="0"/>
-              <a:t>29.07.21</a:t>
+              <a:t>18.01.2022</a:t>
             </a:fld>
             <a:endParaRPr lang="de-DE"/>
           </a:p>
@@ -9266,7 +10957,1494 @@
           <a:p>
             <a:fld id="{312A73BE-F097-4DBB-AEB2-4CC070160BA0}" type="slidenum">
               <a:rPr lang="de-DE" smtClean="0"/>
-              <a:t>5</a:t>
+              <a:t>6</a:t>
+            </a:fld>
+            <a:endParaRPr lang="de-DE"/>
+          </a:p>
+        </p:txBody>
+      </p:sp>
+    </p:spTree>
+    <p:extLst>
+      <p:ext uri="{BB962C8B-B14F-4D97-AF65-F5344CB8AC3E}">
+        <p14:creationId xmlns:p14="http://schemas.microsoft.com/office/powerpoint/2010/main" val="72016476"/>
+      </p:ext>
+    </p:extLst>
+  </p:cSld>
+  <p:clrMapOvr>
+    <a:masterClrMapping/>
+  </p:clrMapOvr>
+  <p:timing>
+    <p:tnLst>
+      <p:par>
+        <p:cTn id="1" dur="indefinite" restart="never" nodeType="tmRoot">
+          <p:childTnLst>
+            <p:seq concurrent="1" nextAc="seek">
+              <p:cTn id="2" dur="indefinite" nodeType="mainSeq">
+                <p:childTnLst>
+                  <p:par>
+                    <p:cTn id="3" fill="hold">
+                      <p:stCondLst>
+                        <p:cond delay="indefinite"/>
+                      </p:stCondLst>
+                      <p:childTnLst>
+                        <p:par>
+                          <p:cTn id="4" fill="hold">
+                            <p:stCondLst>
+                              <p:cond delay="0"/>
+                            </p:stCondLst>
+                            <p:childTnLst>
+                              <p:par>
+                                <p:cTn id="5" presetID="10" presetClass="entr" presetSubtype="0" fill="hold" nodeType="clickEffect">
+                                  <p:stCondLst>
+                                    <p:cond delay="0"/>
+                                  </p:stCondLst>
+                                  <p:childTnLst>
+                                    <p:set>
+                                      <p:cBhvr>
+                                        <p:cTn id="6" dur="1" fill="hold">
+                                          <p:stCondLst>
+                                            <p:cond delay="0"/>
+                                          </p:stCondLst>
+                                        </p:cTn>
+                                        <p:tgtEl>
+                                          <p:spTgt spid="6">
+                                            <p:txEl>
+                                              <p:pRg st="0" end="0"/>
+                                            </p:txEl>
+                                          </p:spTgt>
+                                        </p:tgtEl>
+                                        <p:attrNameLst>
+                                          <p:attrName>style.visibility</p:attrName>
+                                        </p:attrNameLst>
+                                      </p:cBhvr>
+                                      <p:to>
+                                        <p:strVal val="visible"/>
+                                      </p:to>
+                                    </p:set>
+                                    <p:animEffect transition="in" filter="fade">
+                                      <p:cBhvr>
+                                        <p:cTn id="7" dur="500"/>
+                                        <p:tgtEl>
+                                          <p:spTgt spid="6">
+                                            <p:txEl>
+                                              <p:pRg st="0" end="0"/>
+                                            </p:txEl>
+                                          </p:spTgt>
+                                        </p:tgtEl>
+                                      </p:cBhvr>
+                                    </p:animEffect>
+                                  </p:childTnLst>
+                                </p:cTn>
+                              </p:par>
+                            </p:childTnLst>
+                          </p:cTn>
+                        </p:par>
+                      </p:childTnLst>
+                    </p:cTn>
+                  </p:par>
+                  <p:par>
+                    <p:cTn id="8" fill="hold">
+                      <p:stCondLst>
+                        <p:cond delay="indefinite"/>
+                      </p:stCondLst>
+                      <p:childTnLst>
+                        <p:par>
+                          <p:cTn id="9" fill="hold">
+                            <p:stCondLst>
+                              <p:cond delay="0"/>
+                            </p:stCondLst>
+                            <p:childTnLst>
+                              <p:par>
+                                <p:cTn id="10" presetID="10" presetClass="entr" presetSubtype="0" fill="hold" nodeType="clickEffect">
+                                  <p:stCondLst>
+                                    <p:cond delay="0"/>
+                                  </p:stCondLst>
+                                  <p:childTnLst>
+                                    <p:set>
+                                      <p:cBhvr>
+                                        <p:cTn id="11" dur="1" fill="hold">
+                                          <p:stCondLst>
+                                            <p:cond delay="0"/>
+                                          </p:stCondLst>
+                                        </p:cTn>
+                                        <p:tgtEl>
+                                          <p:spTgt spid="6">
+                                            <p:txEl>
+                                              <p:pRg st="2" end="2"/>
+                                            </p:txEl>
+                                          </p:spTgt>
+                                        </p:tgtEl>
+                                        <p:attrNameLst>
+                                          <p:attrName>style.visibility</p:attrName>
+                                        </p:attrNameLst>
+                                      </p:cBhvr>
+                                      <p:to>
+                                        <p:strVal val="visible"/>
+                                      </p:to>
+                                    </p:set>
+                                    <p:animEffect transition="in" filter="fade">
+                                      <p:cBhvr>
+                                        <p:cTn id="12" dur="500"/>
+                                        <p:tgtEl>
+                                          <p:spTgt spid="6">
+                                            <p:txEl>
+                                              <p:pRg st="2" end="2"/>
+                                            </p:txEl>
+                                          </p:spTgt>
+                                        </p:tgtEl>
+                                      </p:cBhvr>
+                                    </p:animEffect>
+                                  </p:childTnLst>
+                                </p:cTn>
+                              </p:par>
+                            </p:childTnLst>
+                          </p:cTn>
+                        </p:par>
+                      </p:childTnLst>
+                    </p:cTn>
+                  </p:par>
+                  <p:par>
+                    <p:cTn id="13" fill="hold">
+                      <p:stCondLst>
+                        <p:cond delay="indefinite"/>
+                      </p:stCondLst>
+                      <p:childTnLst>
+                        <p:par>
+                          <p:cTn id="14" fill="hold">
+                            <p:stCondLst>
+                              <p:cond delay="0"/>
+                            </p:stCondLst>
+                            <p:childTnLst>
+                              <p:par>
+                                <p:cTn id="15" presetID="10" presetClass="entr" presetSubtype="0" fill="hold" nodeType="clickEffect">
+                                  <p:stCondLst>
+                                    <p:cond delay="0"/>
+                                  </p:stCondLst>
+                                  <p:childTnLst>
+                                    <p:set>
+                                      <p:cBhvr>
+                                        <p:cTn id="16" dur="1" fill="hold">
+                                          <p:stCondLst>
+                                            <p:cond delay="0"/>
+                                          </p:stCondLst>
+                                        </p:cTn>
+                                        <p:tgtEl>
+                                          <p:spTgt spid="6">
+                                            <p:txEl>
+                                              <p:pRg st="3" end="3"/>
+                                            </p:txEl>
+                                          </p:spTgt>
+                                        </p:tgtEl>
+                                        <p:attrNameLst>
+                                          <p:attrName>style.visibility</p:attrName>
+                                        </p:attrNameLst>
+                                      </p:cBhvr>
+                                      <p:to>
+                                        <p:strVal val="visible"/>
+                                      </p:to>
+                                    </p:set>
+                                    <p:animEffect transition="in" filter="fade">
+                                      <p:cBhvr>
+                                        <p:cTn id="17" dur="500"/>
+                                        <p:tgtEl>
+                                          <p:spTgt spid="6">
+                                            <p:txEl>
+                                              <p:pRg st="3" end="3"/>
+                                            </p:txEl>
+                                          </p:spTgt>
+                                        </p:tgtEl>
+                                      </p:cBhvr>
+                                    </p:animEffect>
+                                  </p:childTnLst>
+                                </p:cTn>
+                              </p:par>
+                            </p:childTnLst>
+                          </p:cTn>
+                        </p:par>
+                      </p:childTnLst>
+                    </p:cTn>
+                  </p:par>
+                  <p:par>
+                    <p:cTn id="18" fill="hold">
+                      <p:stCondLst>
+                        <p:cond delay="indefinite"/>
+                      </p:stCondLst>
+                      <p:childTnLst>
+                        <p:par>
+                          <p:cTn id="19" fill="hold">
+                            <p:stCondLst>
+                              <p:cond delay="0"/>
+                            </p:stCondLst>
+                            <p:childTnLst>
+                              <p:par>
+                                <p:cTn id="20" presetID="10" presetClass="entr" presetSubtype="0" fill="hold" nodeType="clickEffect">
+                                  <p:stCondLst>
+                                    <p:cond delay="0"/>
+                                  </p:stCondLst>
+                                  <p:childTnLst>
+                                    <p:set>
+                                      <p:cBhvr>
+                                        <p:cTn id="21" dur="1" fill="hold">
+                                          <p:stCondLst>
+                                            <p:cond delay="0"/>
+                                          </p:stCondLst>
+                                        </p:cTn>
+                                        <p:tgtEl>
+                                          <p:spTgt spid="6">
+                                            <p:txEl>
+                                              <p:pRg st="4" end="4"/>
+                                            </p:txEl>
+                                          </p:spTgt>
+                                        </p:tgtEl>
+                                        <p:attrNameLst>
+                                          <p:attrName>style.visibility</p:attrName>
+                                        </p:attrNameLst>
+                                      </p:cBhvr>
+                                      <p:to>
+                                        <p:strVal val="visible"/>
+                                      </p:to>
+                                    </p:set>
+                                    <p:animEffect transition="in" filter="fade">
+                                      <p:cBhvr>
+                                        <p:cTn id="22" dur="500"/>
+                                        <p:tgtEl>
+                                          <p:spTgt spid="6">
+                                            <p:txEl>
+                                              <p:pRg st="4" end="4"/>
+                                            </p:txEl>
+                                          </p:spTgt>
+                                        </p:tgtEl>
+                                      </p:cBhvr>
+                                    </p:animEffect>
+                                  </p:childTnLst>
+                                </p:cTn>
+                              </p:par>
+                            </p:childTnLst>
+                          </p:cTn>
+                        </p:par>
+                      </p:childTnLst>
+                    </p:cTn>
+                  </p:par>
+                </p:childTnLst>
+              </p:cTn>
+              <p:prevCondLst>
+                <p:cond evt="onPrev" delay="0">
+                  <p:tgtEl>
+                    <p:sldTgt/>
+                  </p:tgtEl>
+                </p:cond>
+              </p:prevCondLst>
+              <p:nextCondLst>
+                <p:cond evt="onNext" delay="0">
+                  <p:tgtEl>
+                    <p:sldTgt/>
+                  </p:tgtEl>
+                </p:cond>
+              </p:nextCondLst>
+            </p:seq>
+          </p:childTnLst>
+        </p:cTn>
+      </p:par>
+    </p:tnLst>
+  </p:timing>
+</p:sld>
+</file>
+
+<file path=ppt/slides/slide7.xml><?xml version="1.0" encoding="utf-8"?>
+<p:sld xmlns:a="http://schemas.openxmlformats.org/drawingml/2006/main" xmlns:r="http://schemas.openxmlformats.org/officeDocument/2006/relationships" xmlns:p="http://schemas.openxmlformats.org/presentationml/2006/main">
+  <p:cSld>
+    <p:spTree>
+      <p:nvGrpSpPr>
+        <p:cNvPr id="1" name=""/>
+        <p:cNvGrpSpPr/>
+        <p:nvPr/>
+      </p:nvGrpSpPr>
+      <p:grpSpPr>
+        <a:xfrm>
+          <a:off x="0" y="0"/>
+          <a:ext cx="0" cy="0"/>
+          <a:chOff x="0" y="0"/>
+          <a:chExt cx="0" cy="0"/>
+        </a:xfrm>
+      </p:grpSpPr>
+      <p:sp>
+        <p:nvSpPr>
+          <p:cNvPr id="5" name="Titel 4">
+            <a:extLst>
+              <a:ext uri="{FF2B5EF4-FFF2-40B4-BE49-F238E27FC236}">
+                <a16:creationId xmlns:a16="http://schemas.microsoft.com/office/drawing/2014/main" id="{BDF2C912-E02F-4E1F-82DF-351A88BA5B31}"/>
+              </a:ext>
+            </a:extLst>
+          </p:cNvPr>
+          <p:cNvSpPr>
+            <a:spLocks noGrp="1"/>
+          </p:cNvSpPr>
+          <p:nvPr>
+            <p:ph type="title"/>
+          </p:nvPr>
+        </p:nvSpPr>
+        <p:spPr>
+          <a:xfrm>
+            <a:off x="838200" y="365125"/>
+            <a:ext cx="7958667" cy="1137104"/>
+          </a:xfrm>
+        </p:spPr>
+        <p:txBody>
+          <a:bodyPr anchor="b">
+            <a:normAutofit/>
+          </a:bodyPr>
+          <a:lstStyle/>
+          <a:p>
+            <a:r>
+              <a:rPr lang="de-DE" sz="4400" dirty="0" err="1">
+                <a:solidFill>
+                  <a:schemeClr val="tx1">
+                    <a:lumMod val="95000"/>
+                  </a:schemeClr>
+                </a:solidFill>
+              </a:rPr>
+              <a:t>datetime</a:t>
+            </a:r>
+            <a:endParaRPr lang="de-DE" sz="4400" dirty="0">
+              <a:solidFill>
+                <a:schemeClr val="tx1">
+                  <a:lumMod val="95000"/>
+                </a:schemeClr>
+              </a:solidFill>
+            </a:endParaRPr>
+          </a:p>
+        </p:txBody>
+      </p:sp>
+      <p:sp>
+        <p:nvSpPr>
+          <p:cNvPr id="6" name="Inhaltsplatzhalter 5">
+            <a:extLst>
+              <a:ext uri="{FF2B5EF4-FFF2-40B4-BE49-F238E27FC236}">
+                <a16:creationId xmlns:a16="http://schemas.microsoft.com/office/drawing/2014/main" id="{67FD4DD5-46C1-4974-A569-BB95F27DCC4F}"/>
+              </a:ext>
+            </a:extLst>
+          </p:cNvPr>
+          <p:cNvSpPr>
+            <a:spLocks noGrp="1"/>
+          </p:cNvSpPr>
+          <p:nvPr>
+            <p:ph idx="1"/>
+          </p:nvPr>
+        </p:nvSpPr>
+        <p:spPr>
+          <a:xfrm>
+            <a:off x="838201" y="1825625"/>
+            <a:ext cx="7958666" cy="4351338"/>
+          </a:xfrm>
+        </p:spPr>
+        <p:txBody>
+          <a:bodyPr>
+            <a:normAutofit/>
+          </a:bodyPr>
+          <a:lstStyle/>
+          <a:p>
+            <a:r>
+              <a:rPr lang="de-DE" sz="2400" dirty="0">
+                <a:solidFill>
+                  <a:schemeClr val="tx1">
+                    <a:lumMod val="95000"/>
+                  </a:schemeClr>
+                </a:solidFill>
+              </a:rPr>
+              <a:t>Mit </a:t>
+            </a:r>
+            <a:r>
+              <a:rPr lang="de-DE" sz="2400" dirty="0" err="1">
+                <a:solidFill>
+                  <a:schemeClr val="tx1">
+                    <a:lumMod val="95000"/>
+                  </a:schemeClr>
+                </a:solidFill>
+              </a:rPr>
+              <a:t>datetime</a:t>
+            </a:r>
+            <a:r>
+              <a:rPr lang="de-DE" sz="2400" dirty="0">
+                <a:solidFill>
+                  <a:schemeClr val="tx1">
+                    <a:lumMod val="95000"/>
+                  </a:schemeClr>
+                </a:solidFill>
+              </a:rPr>
+              <a:t> können wir </a:t>
+            </a:r>
+            <a:r>
+              <a:rPr lang="de-DE" sz="2400" dirty="0" err="1">
+                <a:solidFill>
+                  <a:schemeClr val="tx1">
+                    <a:lumMod val="95000"/>
+                  </a:schemeClr>
+                </a:solidFill>
+              </a:rPr>
+              <a:t>z.b</a:t>
+            </a:r>
+            <a:r>
+              <a:rPr lang="de-DE" sz="2400" dirty="0">
+                <a:solidFill>
+                  <a:schemeClr val="tx1">
+                    <a:lumMod val="95000"/>
+                  </a:schemeClr>
+                </a:solidFill>
+              </a:rPr>
+              <a:t> das Aktuelle Datum und die Uhrzeit ausgeben lassen</a:t>
+            </a:r>
+          </a:p>
+          <a:p>
+            <a:pPr lvl="1"/>
+            <a:r>
+              <a:rPr lang="de-DE" sz="2000" dirty="0" err="1">
+                <a:solidFill>
+                  <a:schemeClr val="tx1">
+                    <a:lumMod val="95000"/>
+                  </a:schemeClr>
+                </a:solidFill>
+              </a:rPr>
+              <a:t>now</a:t>
+            </a:r>
+            <a:r>
+              <a:rPr lang="de-DE" sz="2000" dirty="0">
+                <a:solidFill>
+                  <a:schemeClr val="tx1">
+                    <a:lumMod val="95000"/>
+                  </a:schemeClr>
+                </a:solidFill>
+              </a:rPr>
+              <a:t>()</a:t>
+            </a:r>
+          </a:p>
+          <a:p>
+            <a:pPr lvl="2"/>
+            <a:r>
+              <a:rPr lang="de-DE" sz="1600" dirty="0">
+                <a:solidFill>
+                  <a:schemeClr val="tx1">
+                    <a:lumMod val="95000"/>
+                  </a:schemeClr>
+                </a:solidFill>
+              </a:rPr>
+              <a:t>Gibt uns das Aktuelle Datum und die Uhrzeit aus</a:t>
+            </a:r>
+          </a:p>
+          <a:p>
+            <a:pPr lvl="1"/>
+            <a:r>
+              <a:rPr lang="de-DE" sz="2000" dirty="0">
+                <a:solidFill>
+                  <a:schemeClr val="tx1">
+                    <a:lumMod val="95000"/>
+                  </a:schemeClr>
+                </a:solidFill>
+              </a:rPr>
+              <a:t>Das </a:t>
+            </a:r>
+            <a:r>
+              <a:rPr lang="de-DE" sz="2000" dirty="0" err="1">
+                <a:solidFill>
+                  <a:schemeClr val="tx1">
+                    <a:lumMod val="95000"/>
+                  </a:schemeClr>
+                </a:solidFill>
+              </a:rPr>
+              <a:t>datetime</a:t>
+            </a:r>
+            <a:r>
+              <a:rPr lang="de-DE" sz="2000" dirty="0">
+                <a:solidFill>
+                  <a:schemeClr val="tx1">
+                    <a:lumMod val="95000"/>
+                  </a:schemeClr>
+                </a:solidFill>
+              </a:rPr>
+              <a:t>-objekt das </a:t>
+            </a:r>
+            <a:r>
+              <a:rPr lang="de-DE" sz="2000" dirty="0" err="1">
+                <a:solidFill>
+                  <a:schemeClr val="tx1">
+                    <a:lumMod val="95000"/>
+                  </a:schemeClr>
+                </a:solidFill>
+              </a:rPr>
+              <a:t>now</a:t>
+            </a:r>
+            <a:r>
+              <a:rPr lang="de-DE" sz="2000" dirty="0">
+                <a:solidFill>
+                  <a:schemeClr val="tx1">
+                    <a:lumMod val="95000"/>
+                  </a:schemeClr>
+                </a:solidFill>
+              </a:rPr>
+              <a:t>() erstellt hat wiederum </a:t>
+            </a:r>
+            <a:r>
+              <a:rPr lang="de-DE" sz="2000" dirty="0" err="1">
+                <a:solidFill>
+                  <a:schemeClr val="tx1">
+                    <a:lumMod val="95000"/>
+                  </a:schemeClr>
+                </a:solidFill>
+              </a:rPr>
+              <a:t>methoden</a:t>
+            </a:r>
+            <a:r>
+              <a:rPr lang="de-DE" sz="2000" dirty="0">
+                <a:solidFill>
+                  <a:schemeClr val="tx1">
+                    <a:lumMod val="95000"/>
+                  </a:schemeClr>
+                </a:solidFill>
+              </a:rPr>
+              <a:t> mit denen wir die einzelnen werte wie Jahr, Monat, Tag, Stunde … ausgeben können</a:t>
+            </a:r>
+          </a:p>
+          <a:p>
+            <a:pPr lvl="1"/>
+            <a:r>
+              <a:rPr lang="de-DE" sz="2000" dirty="0">
+                <a:solidFill>
+                  <a:schemeClr val="tx1">
+                    <a:lumMod val="95000"/>
+                  </a:schemeClr>
+                </a:solidFill>
+              </a:rPr>
+              <a:t>…</a:t>
+            </a:r>
+          </a:p>
+          <a:p>
+            <a:endParaRPr lang="de-DE" sz="2000" dirty="0">
+              <a:solidFill>
+                <a:schemeClr val="tx1">
+                  <a:lumMod val="95000"/>
+                </a:schemeClr>
+              </a:solidFill>
+            </a:endParaRPr>
+          </a:p>
+        </p:txBody>
+      </p:sp>
+      <p:sp>
+        <p:nvSpPr>
+          <p:cNvPr id="7" name="Date Placeholder 3">
+            <a:extLst>
+              <a:ext uri="{FF2B5EF4-FFF2-40B4-BE49-F238E27FC236}">
+                <a16:creationId xmlns:a16="http://schemas.microsoft.com/office/drawing/2014/main" id="{18705B3C-262D-45A3-8C90-9FC26244A8CC}"/>
+              </a:ext>
+            </a:extLst>
+          </p:cNvPr>
+          <p:cNvSpPr>
+            <a:spLocks noGrp="1"/>
+          </p:cNvSpPr>
+          <p:nvPr>
+            <p:ph type="dt" sz="half" idx="10"/>
+          </p:nvPr>
+        </p:nvSpPr>
+        <p:spPr>
+          <a:xfrm>
+            <a:off x="838200" y="6356350"/>
+            <a:ext cx="2743200" cy="365125"/>
+          </a:xfrm>
+        </p:spPr>
+        <p:txBody>
+          <a:bodyPr/>
+          <a:lstStyle/>
+          <a:p>
+            <a:fld id="{D4AD37E9-5A10-49A7-855D-CAA2D2E848B6}" type="datetimeFigureOut">
+              <a:rPr lang="de-DE" smtClean="0"/>
+              <a:t>18.01.2022</a:t>
+            </a:fld>
+            <a:endParaRPr lang="de-DE"/>
+          </a:p>
+        </p:txBody>
+      </p:sp>
+      <p:sp>
+        <p:nvSpPr>
+          <p:cNvPr id="8" name="Footer Placeholder 4">
+            <a:extLst>
+              <a:ext uri="{FF2B5EF4-FFF2-40B4-BE49-F238E27FC236}">
+                <a16:creationId xmlns:a16="http://schemas.microsoft.com/office/drawing/2014/main" id="{6833897F-8945-43C1-8EE1-2E83FF8331D9}"/>
+              </a:ext>
+            </a:extLst>
+          </p:cNvPr>
+          <p:cNvSpPr>
+            <a:spLocks noGrp="1"/>
+          </p:cNvSpPr>
+          <p:nvPr>
+            <p:ph type="ftr" sz="quarter" idx="11"/>
+          </p:nvPr>
+        </p:nvSpPr>
+        <p:spPr>
+          <a:xfrm>
+            <a:off x="4038600" y="6356350"/>
+            <a:ext cx="4114800" cy="365125"/>
+          </a:xfrm>
+        </p:spPr>
+        <p:txBody>
+          <a:bodyPr/>
+          <a:lstStyle/>
+          <a:p>
+            <a:r>
+              <a:rPr lang="de-DE" sz="1200" dirty="0" err="1">
+                <a:solidFill>
+                  <a:schemeClr val="tx1">
+                    <a:lumMod val="95000"/>
+                  </a:schemeClr>
+                </a:solidFill>
+              </a:rPr>
+              <a:t>Datetime</a:t>
+            </a:r>
+            <a:r>
+              <a:rPr lang="de-DE" sz="1200" dirty="0">
+                <a:solidFill>
+                  <a:schemeClr val="tx1">
+                    <a:lumMod val="95000"/>
+                  </a:schemeClr>
+                </a:solidFill>
+              </a:rPr>
+              <a:t> </a:t>
+            </a:r>
+            <a:endParaRPr lang="en-US" sz="1200" dirty="0">
+              <a:solidFill>
+                <a:schemeClr val="tx1">
+                  <a:lumMod val="95000"/>
+                </a:schemeClr>
+              </a:solidFill>
+              <a:latin typeface="+mj-lt"/>
+            </a:endParaRPr>
+          </a:p>
+        </p:txBody>
+      </p:sp>
+      <p:sp>
+        <p:nvSpPr>
+          <p:cNvPr id="9" name="Slide Number Placeholder 5">
+            <a:extLst>
+              <a:ext uri="{FF2B5EF4-FFF2-40B4-BE49-F238E27FC236}">
+                <a16:creationId xmlns:a16="http://schemas.microsoft.com/office/drawing/2014/main" id="{4CB1546C-41E9-4CE9-A31D-18CB078FE5F0}"/>
+              </a:ext>
+            </a:extLst>
+          </p:cNvPr>
+          <p:cNvSpPr>
+            <a:spLocks noGrp="1"/>
+          </p:cNvSpPr>
+          <p:nvPr>
+            <p:ph type="sldNum" sz="quarter" idx="12"/>
+          </p:nvPr>
+        </p:nvSpPr>
+        <p:spPr>
+          <a:xfrm>
+            <a:off x="8610600" y="6356350"/>
+            <a:ext cx="2743200" cy="365125"/>
+          </a:xfrm>
+        </p:spPr>
+        <p:txBody>
+          <a:bodyPr/>
+          <a:lstStyle/>
+          <a:p>
+            <a:fld id="{312A73BE-F097-4DBB-AEB2-4CC070160BA0}" type="slidenum">
+              <a:rPr lang="de-DE" smtClean="0"/>
+              <a:t>7</a:t>
+            </a:fld>
+            <a:endParaRPr lang="de-DE"/>
+          </a:p>
+        </p:txBody>
+      </p:sp>
+    </p:spTree>
+    <p:extLst>
+      <p:ext uri="{BB962C8B-B14F-4D97-AF65-F5344CB8AC3E}">
+        <p14:creationId xmlns:p14="http://schemas.microsoft.com/office/powerpoint/2010/main" val="1747905992"/>
+      </p:ext>
+    </p:extLst>
+  </p:cSld>
+  <p:clrMapOvr>
+    <a:masterClrMapping/>
+  </p:clrMapOvr>
+  <p:timing>
+    <p:tnLst>
+      <p:par>
+        <p:cTn id="1" dur="indefinite" restart="never" nodeType="tmRoot">
+          <p:childTnLst>
+            <p:seq concurrent="1" nextAc="seek">
+              <p:cTn id="2" dur="indefinite" nodeType="mainSeq">
+                <p:childTnLst>
+                  <p:par>
+                    <p:cTn id="3" fill="hold">
+                      <p:stCondLst>
+                        <p:cond delay="indefinite"/>
+                      </p:stCondLst>
+                      <p:childTnLst>
+                        <p:par>
+                          <p:cTn id="4" fill="hold">
+                            <p:stCondLst>
+                              <p:cond delay="0"/>
+                            </p:stCondLst>
+                            <p:childTnLst>
+                              <p:par>
+                                <p:cTn id="5" presetID="10" presetClass="entr" presetSubtype="0" fill="hold" nodeType="clickEffect">
+                                  <p:stCondLst>
+                                    <p:cond delay="0"/>
+                                  </p:stCondLst>
+                                  <p:childTnLst>
+                                    <p:set>
+                                      <p:cBhvr>
+                                        <p:cTn id="6" dur="1" fill="hold">
+                                          <p:stCondLst>
+                                            <p:cond delay="0"/>
+                                          </p:stCondLst>
+                                        </p:cTn>
+                                        <p:tgtEl>
+                                          <p:spTgt spid="6">
+                                            <p:txEl>
+                                              <p:pRg st="0" end="0"/>
+                                            </p:txEl>
+                                          </p:spTgt>
+                                        </p:tgtEl>
+                                        <p:attrNameLst>
+                                          <p:attrName>style.visibility</p:attrName>
+                                        </p:attrNameLst>
+                                      </p:cBhvr>
+                                      <p:to>
+                                        <p:strVal val="visible"/>
+                                      </p:to>
+                                    </p:set>
+                                    <p:animEffect transition="in" filter="fade">
+                                      <p:cBhvr>
+                                        <p:cTn id="7" dur="500"/>
+                                        <p:tgtEl>
+                                          <p:spTgt spid="6">
+                                            <p:txEl>
+                                              <p:pRg st="0" end="0"/>
+                                            </p:txEl>
+                                          </p:spTgt>
+                                        </p:tgtEl>
+                                      </p:cBhvr>
+                                    </p:animEffect>
+                                  </p:childTnLst>
+                                </p:cTn>
+                              </p:par>
+                            </p:childTnLst>
+                          </p:cTn>
+                        </p:par>
+                      </p:childTnLst>
+                    </p:cTn>
+                  </p:par>
+                  <p:par>
+                    <p:cTn id="8" fill="hold">
+                      <p:stCondLst>
+                        <p:cond delay="indefinite"/>
+                      </p:stCondLst>
+                      <p:childTnLst>
+                        <p:par>
+                          <p:cTn id="9" fill="hold">
+                            <p:stCondLst>
+                              <p:cond delay="0"/>
+                            </p:stCondLst>
+                            <p:childTnLst>
+                              <p:par>
+                                <p:cTn id="10" presetID="10" presetClass="entr" presetSubtype="0" fill="hold" nodeType="clickEffect">
+                                  <p:stCondLst>
+                                    <p:cond delay="0"/>
+                                  </p:stCondLst>
+                                  <p:childTnLst>
+                                    <p:set>
+                                      <p:cBhvr>
+                                        <p:cTn id="11" dur="1" fill="hold">
+                                          <p:stCondLst>
+                                            <p:cond delay="0"/>
+                                          </p:stCondLst>
+                                        </p:cTn>
+                                        <p:tgtEl>
+                                          <p:spTgt spid="6">
+                                            <p:txEl>
+                                              <p:pRg st="1" end="1"/>
+                                            </p:txEl>
+                                          </p:spTgt>
+                                        </p:tgtEl>
+                                        <p:attrNameLst>
+                                          <p:attrName>style.visibility</p:attrName>
+                                        </p:attrNameLst>
+                                      </p:cBhvr>
+                                      <p:to>
+                                        <p:strVal val="visible"/>
+                                      </p:to>
+                                    </p:set>
+                                    <p:animEffect transition="in" filter="fade">
+                                      <p:cBhvr>
+                                        <p:cTn id="12" dur="500"/>
+                                        <p:tgtEl>
+                                          <p:spTgt spid="6">
+                                            <p:txEl>
+                                              <p:pRg st="1" end="1"/>
+                                            </p:txEl>
+                                          </p:spTgt>
+                                        </p:tgtEl>
+                                      </p:cBhvr>
+                                    </p:animEffect>
+                                  </p:childTnLst>
+                                </p:cTn>
+                              </p:par>
+                            </p:childTnLst>
+                          </p:cTn>
+                        </p:par>
+                      </p:childTnLst>
+                    </p:cTn>
+                  </p:par>
+                  <p:par>
+                    <p:cTn id="13" fill="hold">
+                      <p:stCondLst>
+                        <p:cond delay="indefinite"/>
+                      </p:stCondLst>
+                      <p:childTnLst>
+                        <p:par>
+                          <p:cTn id="14" fill="hold">
+                            <p:stCondLst>
+                              <p:cond delay="0"/>
+                            </p:stCondLst>
+                            <p:childTnLst>
+                              <p:par>
+                                <p:cTn id="15" presetID="10" presetClass="entr" presetSubtype="0" fill="hold" nodeType="clickEffect">
+                                  <p:stCondLst>
+                                    <p:cond delay="0"/>
+                                  </p:stCondLst>
+                                  <p:childTnLst>
+                                    <p:set>
+                                      <p:cBhvr>
+                                        <p:cTn id="16" dur="1" fill="hold">
+                                          <p:stCondLst>
+                                            <p:cond delay="0"/>
+                                          </p:stCondLst>
+                                        </p:cTn>
+                                        <p:tgtEl>
+                                          <p:spTgt spid="6">
+                                            <p:txEl>
+                                              <p:pRg st="2" end="2"/>
+                                            </p:txEl>
+                                          </p:spTgt>
+                                        </p:tgtEl>
+                                        <p:attrNameLst>
+                                          <p:attrName>style.visibility</p:attrName>
+                                        </p:attrNameLst>
+                                      </p:cBhvr>
+                                      <p:to>
+                                        <p:strVal val="visible"/>
+                                      </p:to>
+                                    </p:set>
+                                    <p:animEffect transition="in" filter="fade">
+                                      <p:cBhvr>
+                                        <p:cTn id="17" dur="500"/>
+                                        <p:tgtEl>
+                                          <p:spTgt spid="6">
+                                            <p:txEl>
+                                              <p:pRg st="2" end="2"/>
+                                            </p:txEl>
+                                          </p:spTgt>
+                                        </p:tgtEl>
+                                      </p:cBhvr>
+                                    </p:animEffect>
+                                  </p:childTnLst>
+                                </p:cTn>
+                              </p:par>
+                            </p:childTnLst>
+                          </p:cTn>
+                        </p:par>
+                      </p:childTnLst>
+                    </p:cTn>
+                  </p:par>
+                  <p:par>
+                    <p:cTn id="18" fill="hold">
+                      <p:stCondLst>
+                        <p:cond delay="indefinite"/>
+                      </p:stCondLst>
+                      <p:childTnLst>
+                        <p:par>
+                          <p:cTn id="19" fill="hold">
+                            <p:stCondLst>
+                              <p:cond delay="0"/>
+                            </p:stCondLst>
+                            <p:childTnLst>
+                              <p:par>
+                                <p:cTn id="20" presetID="10" presetClass="entr" presetSubtype="0" fill="hold" nodeType="clickEffect">
+                                  <p:stCondLst>
+                                    <p:cond delay="0"/>
+                                  </p:stCondLst>
+                                  <p:childTnLst>
+                                    <p:set>
+                                      <p:cBhvr>
+                                        <p:cTn id="21" dur="1" fill="hold">
+                                          <p:stCondLst>
+                                            <p:cond delay="0"/>
+                                          </p:stCondLst>
+                                        </p:cTn>
+                                        <p:tgtEl>
+                                          <p:spTgt spid="6">
+                                            <p:txEl>
+                                              <p:pRg st="3" end="3"/>
+                                            </p:txEl>
+                                          </p:spTgt>
+                                        </p:tgtEl>
+                                        <p:attrNameLst>
+                                          <p:attrName>style.visibility</p:attrName>
+                                        </p:attrNameLst>
+                                      </p:cBhvr>
+                                      <p:to>
+                                        <p:strVal val="visible"/>
+                                      </p:to>
+                                    </p:set>
+                                    <p:animEffect transition="in" filter="fade">
+                                      <p:cBhvr>
+                                        <p:cTn id="22" dur="500"/>
+                                        <p:tgtEl>
+                                          <p:spTgt spid="6">
+                                            <p:txEl>
+                                              <p:pRg st="3" end="3"/>
+                                            </p:txEl>
+                                          </p:spTgt>
+                                        </p:tgtEl>
+                                      </p:cBhvr>
+                                    </p:animEffect>
+                                  </p:childTnLst>
+                                </p:cTn>
+                              </p:par>
+                            </p:childTnLst>
+                          </p:cTn>
+                        </p:par>
+                      </p:childTnLst>
+                    </p:cTn>
+                  </p:par>
+                  <p:par>
+                    <p:cTn id="23" fill="hold">
+                      <p:stCondLst>
+                        <p:cond delay="indefinite"/>
+                      </p:stCondLst>
+                      <p:childTnLst>
+                        <p:par>
+                          <p:cTn id="24" fill="hold">
+                            <p:stCondLst>
+                              <p:cond delay="0"/>
+                            </p:stCondLst>
+                            <p:childTnLst>
+                              <p:par>
+                                <p:cTn id="25" presetID="10" presetClass="entr" presetSubtype="0" fill="hold" nodeType="clickEffect">
+                                  <p:stCondLst>
+                                    <p:cond delay="0"/>
+                                  </p:stCondLst>
+                                  <p:childTnLst>
+                                    <p:set>
+                                      <p:cBhvr>
+                                        <p:cTn id="26" dur="1" fill="hold">
+                                          <p:stCondLst>
+                                            <p:cond delay="0"/>
+                                          </p:stCondLst>
+                                        </p:cTn>
+                                        <p:tgtEl>
+                                          <p:spTgt spid="6">
+                                            <p:txEl>
+                                              <p:pRg st="4" end="4"/>
+                                            </p:txEl>
+                                          </p:spTgt>
+                                        </p:tgtEl>
+                                        <p:attrNameLst>
+                                          <p:attrName>style.visibility</p:attrName>
+                                        </p:attrNameLst>
+                                      </p:cBhvr>
+                                      <p:to>
+                                        <p:strVal val="visible"/>
+                                      </p:to>
+                                    </p:set>
+                                    <p:animEffect transition="in" filter="fade">
+                                      <p:cBhvr>
+                                        <p:cTn id="27" dur="500"/>
+                                        <p:tgtEl>
+                                          <p:spTgt spid="6">
+                                            <p:txEl>
+                                              <p:pRg st="4" end="4"/>
+                                            </p:txEl>
+                                          </p:spTgt>
+                                        </p:tgtEl>
+                                      </p:cBhvr>
+                                    </p:animEffect>
+                                  </p:childTnLst>
+                                </p:cTn>
+                              </p:par>
+                            </p:childTnLst>
+                          </p:cTn>
+                        </p:par>
+                      </p:childTnLst>
+                    </p:cTn>
+                  </p:par>
+                </p:childTnLst>
+              </p:cTn>
+              <p:prevCondLst>
+                <p:cond evt="onPrev" delay="0">
+                  <p:tgtEl>
+                    <p:sldTgt/>
+                  </p:tgtEl>
+                </p:cond>
+              </p:prevCondLst>
+              <p:nextCondLst>
+                <p:cond evt="onNext" delay="0">
+                  <p:tgtEl>
+                    <p:sldTgt/>
+                  </p:tgtEl>
+                </p:cond>
+              </p:nextCondLst>
+            </p:seq>
+          </p:childTnLst>
+        </p:cTn>
+      </p:par>
+    </p:tnLst>
+  </p:timing>
+</p:sld>
+</file>
+
+<file path=ppt/slides/slide8.xml><?xml version="1.0" encoding="utf-8"?>
+<p:sld xmlns:a="http://schemas.openxmlformats.org/drawingml/2006/main" xmlns:r="http://schemas.openxmlformats.org/officeDocument/2006/relationships" xmlns:p="http://schemas.openxmlformats.org/presentationml/2006/main">
+  <p:cSld>
+    <p:spTree>
+      <p:nvGrpSpPr>
+        <p:cNvPr id="1" name=""/>
+        <p:cNvGrpSpPr/>
+        <p:nvPr/>
+      </p:nvGrpSpPr>
+      <p:grpSpPr>
+        <a:xfrm>
+          <a:off x="0" y="0"/>
+          <a:ext cx="0" cy="0"/>
+          <a:chOff x="0" y="0"/>
+          <a:chExt cx="0" cy="0"/>
+        </a:xfrm>
+      </p:grpSpPr>
+      <p:sp>
+        <p:nvSpPr>
+          <p:cNvPr id="5" name="Titel 4">
+            <a:extLst>
+              <a:ext uri="{FF2B5EF4-FFF2-40B4-BE49-F238E27FC236}">
+                <a16:creationId xmlns:a16="http://schemas.microsoft.com/office/drawing/2014/main" id="{BDF2C912-E02F-4E1F-82DF-351A88BA5B31}"/>
+              </a:ext>
+            </a:extLst>
+          </p:cNvPr>
+          <p:cNvSpPr>
+            <a:spLocks noGrp="1"/>
+          </p:cNvSpPr>
+          <p:nvPr>
+            <p:ph type="title"/>
+          </p:nvPr>
+        </p:nvSpPr>
+        <p:spPr>
+          <a:xfrm>
+            <a:off x="838200" y="365125"/>
+            <a:ext cx="7958667" cy="1137104"/>
+          </a:xfrm>
+        </p:spPr>
+        <p:txBody>
+          <a:bodyPr anchor="b">
+            <a:normAutofit/>
+          </a:bodyPr>
+          <a:lstStyle/>
+          <a:p>
+            <a:r>
+              <a:rPr lang="de-DE" sz="4400" dirty="0" err="1">
+                <a:solidFill>
+                  <a:schemeClr val="tx1">
+                    <a:lumMod val="95000"/>
+                  </a:schemeClr>
+                </a:solidFill>
+              </a:rPr>
+              <a:t>strftime</a:t>
+            </a:r>
+            <a:endParaRPr lang="de-DE" sz="4400" dirty="0">
+              <a:solidFill>
+                <a:schemeClr val="tx1">
+                  <a:lumMod val="95000"/>
+                </a:schemeClr>
+              </a:solidFill>
+            </a:endParaRPr>
+          </a:p>
+        </p:txBody>
+      </p:sp>
+      <p:sp>
+        <p:nvSpPr>
+          <p:cNvPr id="6" name="Inhaltsplatzhalter 5">
+            <a:extLst>
+              <a:ext uri="{FF2B5EF4-FFF2-40B4-BE49-F238E27FC236}">
+                <a16:creationId xmlns:a16="http://schemas.microsoft.com/office/drawing/2014/main" id="{67FD4DD5-46C1-4974-A569-BB95F27DCC4F}"/>
+              </a:ext>
+            </a:extLst>
+          </p:cNvPr>
+          <p:cNvSpPr>
+            <a:spLocks noGrp="1"/>
+          </p:cNvSpPr>
+          <p:nvPr>
+            <p:ph idx="1"/>
+          </p:nvPr>
+        </p:nvSpPr>
+        <p:spPr>
+          <a:xfrm>
+            <a:off x="838201" y="1825625"/>
+            <a:ext cx="7958666" cy="4351338"/>
+          </a:xfrm>
+        </p:spPr>
+        <p:txBody>
+          <a:bodyPr>
+            <a:normAutofit/>
+          </a:bodyPr>
+          <a:lstStyle/>
+          <a:p>
+            <a:r>
+              <a:rPr lang="de-DE" sz="2400" dirty="0" err="1">
+                <a:solidFill>
+                  <a:schemeClr val="tx1">
+                    <a:lumMod val="95000"/>
+                  </a:schemeClr>
+                </a:solidFill>
+              </a:rPr>
+              <a:t>strftime</a:t>
+            </a:r>
+            <a:r>
+              <a:rPr lang="de-DE" sz="2400" dirty="0">
+                <a:solidFill>
+                  <a:schemeClr val="tx1">
+                    <a:lumMod val="95000"/>
+                  </a:schemeClr>
+                </a:solidFill>
+              </a:rPr>
+              <a:t> wird verwendet um aus einem </a:t>
+            </a:r>
+            <a:r>
+              <a:rPr lang="de-DE" sz="2400" dirty="0" err="1">
+                <a:solidFill>
+                  <a:schemeClr val="tx1">
+                    <a:lumMod val="95000"/>
+                  </a:schemeClr>
+                </a:solidFill>
+              </a:rPr>
+              <a:t>datetime</a:t>
+            </a:r>
+            <a:r>
+              <a:rPr lang="de-DE" sz="2400" dirty="0">
+                <a:solidFill>
+                  <a:schemeClr val="tx1">
+                    <a:lumMod val="95000"/>
+                  </a:schemeClr>
+                </a:solidFill>
+              </a:rPr>
+              <a:t>-Objekt einen String zu erstellen</a:t>
+            </a:r>
+          </a:p>
+          <a:p>
+            <a:r>
+              <a:rPr lang="de-DE" sz="2400" dirty="0">
+                <a:solidFill>
+                  <a:schemeClr val="tx1">
+                    <a:lumMod val="95000"/>
+                  </a:schemeClr>
+                </a:solidFill>
+              </a:rPr>
+              <a:t>Die </a:t>
+            </a:r>
+            <a:r>
+              <a:rPr lang="de-DE" sz="2400" dirty="0" err="1">
+                <a:solidFill>
+                  <a:schemeClr val="tx1">
+                    <a:lumMod val="95000"/>
+                  </a:schemeClr>
+                </a:solidFill>
+              </a:rPr>
+              <a:t>strftime</a:t>
+            </a:r>
+            <a:r>
+              <a:rPr lang="de-DE" sz="2400" dirty="0">
+                <a:solidFill>
+                  <a:schemeClr val="tx1">
+                    <a:lumMod val="95000"/>
+                  </a:schemeClr>
+                </a:solidFill>
+              </a:rPr>
+              <a:t>()-Methode benötigt einen Formatierungscode </a:t>
+            </a:r>
+          </a:p>
+          <a:p>
+            <a:pPr lvl="1"/>
+            <a:r>
+              <a:rPr lang="de-DE" sz="2000" dirty="0" err="1">
+                <a:solidFill>
+                  <a:schemeClr val="tx1">
+                    <a:lumMod val="95000"/>
+                  </a:schemeClr>
+                </a:solidFill>
+              </a:rPr>
+              <a:t>dd</a:t>
+            </a:r>
+            <a:r>
+              <a:rPr lang="de-DE" sz="2000" dirty="0">
+                <a:solidFill>
+                  <a:schemeClr val="tx1">
+                    <a:lumMod val="95000"/>
+                  </a:schemeClr>
+                </a:solidFill>
+              </a:rPr>
+              <a:t>/mm/</a:t>
+            </a:r>
+            <a:r>
+              <a:rPr lang="de-DE" sz="2000" dirty="0" err="1">
+                <a:solidFill>
+                  <a:schemeClr val="tx1">
+                    <a:lumMod val="95000"/>
+                  </a:schemeClr>
+                </a:solidFill>
+              </a:rPr>
+              <a:t>yyyy</a:t>
+            </a:r>
+            <a:endParaRPr lang="de-DE" sz="2000" dirty="0">
+              <a:solidFill>
+                <a:schemeClr val="tx1">
+                  <a:lumMod val="95000"/>
+                </a:schemeClr>
+              </a:solidFill>
+            </a:endParaRPr>
+          </a:p>
+          <a:p>
+            <a:pPr lvl="1"/>
+            <a:r>
+              <a:rPr lang="de-DE" sz="2000" dirty="0" err="1">
+                <a:solidFill>
+                  <a:schemeClr val="tx1">
+                    <a:lumMod val="95000"/>
+                  </a:schemeClr>
+                </a:solidFill>
+              </a:rPr>
+              <a:t>yyyy</a:t>
+            </a:r>
+            <a:r>
+              <a:rPr lang="de-DE" sz="2000" dirty="0">
+                <a:solidFill>
+                  <a:schemeClr val="tx1">
+                    <a:lumMod val="95000"/>
+                  </a:schemeClr>
+                </a:solidFill>
+              </a:rPr>
+              <a:t>/</a:t>
+            </a:r>
+            <a:r>
+              <a:rPr lang="de-DE" sz="2000" dirty="0" err="1">
+                <a:solidFill>
+                  <a:schemeClr val="tx1">
+                    <a:lumMod val="95000"/>
+                  </a:schemeClr>
+                </a:solidFill>
+              </a:rPr>
+              <a:t>dd</a:t>
+            </a:r>
+            <a:r>
+              <a:rPr lang="de-DE" sz="2000" dirty="0">
+                <a:solidFill>
+                  <a:schemeClr val="tx1">
+                    <a:lumMod val="95000"/>
+                  </a:schemeClr>
+                </a:solidFill>
+              </a:rPr>
+              <a:t>/mm</a:t>
+            </a:r>
+          </a:p>
+          <a:p>
+            <a:pPr lvl="1"/>
+            <a:r>
+              <a:rPr lang="de-DE" sz="2000" dirty="0" err="1">
+                <a:solidFill>
+                  <a:schemeClr val="tx1">
+                    <a:lumMod val="95000"/>
+                  </a:schemeClr>
+                </a:solidFill>
+              </a:rPr>
+              <a:t>dd</a:t>
+            </a:r>
+            <a:r>
+              <a:rPr lang="de-DE" sz="2000" dirty="0">
+                <a:solidFill>
+                  <a:schemeClr val="tx1">
+                    <a:lumMod val="95000"/>
+                  </a:schemeClr>
+                </a:solidFill>
+              </a:rPr>
+              <a:t>/mm/</a:t>
+            </a:r>
+            <a:r>
+              <a:rPr lang="de-DE" sz="2000" dirty="0" err="1">
+                <a:solidFill>
+                  <a:schemeClr val="tx1">
+                    <a:lumMod val="95000"/>
+                  </a:schemeClr>
+                </a:solidFill>
+              </a:rPr>
+              <a:t>yyyy</a:t>
+            </a:r>
+            <a:r>
+              <a:rPr lang="de-DE" sz="2000" dirty="0">
+                <a:solidFill>
+                  <a:schemeClr val="tx1">
+                    <a:lumMod val="95000"/>
+                  </a:schemeClr>
+                </a:solidFill>
+              </a:rPr>
+              <a:t> H:M:S</a:t>
+            </a:r>
+            <a:endParaRPr lang="de-DE" sz="2000" b="1" dirty="0">
+              <a:solidFill>
+                <a:schemeClr val="tx1">
+                  <a:lumMod val="95000"/>
+                </a:schemeClr>
+              </a:solidFill>
+            </a:endParaRPr>
+          </a:p>
+          <a:p>
+            <a:pPr marL="457200" lvl="1" indent="0">
+              <a:buNone/>
+            </a:pPr>
+            <a:r>
+              <a:rPr lang="de-DE" sz="1200" dirty="0">
+                <a:solidFill>
+                  <a:schemeClr val="tx1">
+                    <a:lumMod val="95000"/>
+                  </a:schemeClr>
+                </a:solidFill>
+              </a:rPr>
+              <a:t>…</a:t>
+            </a:r>
+          </a:p>
+          <a:p>
+            <a:endParaRPr lang="de-DE" sz="2000" dirty="0">
+              <a:solidFill>
+                <a:schemeClr val="tx1">
+                  <a:lumMod val="95000"/>
+                </a:schemeClr>
+              </a:solidFill>
+            </a:endParaRPr>
+          </a:p>
+        </p:txBody>
+      </p:sp>
+      <p:sp>
+        <p:nvSpPr>
+          <p:cNvPr id="7" name="Date Placeholder 3">
+            <a:extLst>
+              <a:ext uri="{FF2B5EF4-FFF2-40B4-BE49-F238E27FC236}">
+                <a16:creationId xmlns:a16="http://schemas.microsoft.com/office/drawing/2014/main" id="{18705B3C-262D-45A3-8C90-9FC26244A8CC}"/>
+              </a:ext>
+            </a:extLst>
+          </p:cNvPr>
+          <p:cNvSpPr>
+            <a:spLocks noGrp="1"/>
+          </p:cNvSpPr>
+          <p:nvPr>
+            <p:ph type="dt" sz="half" idx="10"/>
+          </p:nvPr>
+        </p:nvSpPr>
+        <p:spPr>
+          <a:xfrm>
+            <a:off x="838200" y="6356350"/>
+            <a:ext cx="2743200" cy="365125"/>
+          </a:xfrm>
+        </p:spPr>
+        <p:txBody>
+          <a:bodyPr/>
+          <a:lstStyle/>
+          <a:p>
+            <a:fld id="{D4AD37E9-5A10-49A7-855D-CAA2D2E848B6}" type="datetimeFigureOut">
+              <a:rPr lang="de-DE" smtClean="0"/>
+              <a:t>18.01.2022</a:t>
+            </a:fld>
+            <a:endParaRPr lang="de-DE"/>
+          </a:p>
+        </p:txBody>
+      </p:sp>
+      <p:sp>
+        <p:nvSpPr>
+          <p:cNvPr id="8" name="Footer Placeholder 4">
+            <a:extLst>
+              <a:ext uri="{FF2B5EF4-FFF2-40B4-BE49-F238E27FC236}">
+                <a16:creationId xmlns:a16="http://schemas.microsoft.com/office/drawing/2014/main" id="{6833897F-8945-43C1-8EE1-2E83FF8331D9}"/>
+              </a:ext>
+            </a:extLst>
+          </p:cNvPr>
+          <p:cNvSpPr>
+            <a:spLocks noGrp="1"/>
+          </p:cNvSpPr>
+          <p:nvPr>
+            <p:ph type="ftr" sz="quarter" idx="11"/>
+          </p:nvPr>
+        </p:nvSpPr>
+        <p:spPr>
+          <a:xfrm>
+            <a:off x="4038600" y="6356350"/>
+            <a:ext cx="4114800" cy="365125"/>
+          </a:xfrm>
+        </p:spPr>
+        <p:txBody>
+          <a:bodyPr/>
+          <a:lstStyle/>
+          <a:p>
+            <a:r>
+              <a:rPr lang="de-DE" sz="1200" dirty="0" err="1">
+                <a:solidFill>
+                  <a:schemeClr val="tx1">
+                    <a:lumMod val="95000"/>
+                  </a:schemeClr>
+                </a:solidFill>
+              </a:rPr>
+              <a:t>Datetime</a:t>
+            </a:r>
+            <a:r>
+              <a:rPr lang="de-DE" sz="1200" dirty="0">
+                <a:solidFill>
+                  <a:schemeClr val="tx1">
+                    <a:lumMod val="95000"/>
+                  </a:schemeClr>
+                </a:solidFill>
+              </a:rPr>
+              <a:t> </a:t>
+            </a:r>
+            <a:endParaRPr lang="en-US" sz="1200" dirty="0">
+              <a:solidFill>
+                <a:schemeClr val="tx1">
+                  <a:lumMod val="95000"/>
+                </a:schemeClr>
+              </a:solidFill>
+              <a:latin typeface="+mj-lt"/>
+            </a:endParaRPr>
+          </a:p>
+        </p:txBody>
+      </p:sp>
+      <p:sp>
+        <p:nvSpPr>
+          <p:cNvPr id="9" name="Slide Number Placeholder 5">
+            <a:extLst>
+              <a:ext uri="{FF2B5EF4-FFF2-40B4-BE49-F238E27FC236}">
+                <a16:creationId xmlns:a16="http://schemas.microsoft.com/office/drawing/2014/main" id="{4CB1546C-41E9-4CE9-A31D-18CB078FE5F0}"/>
+              </a:ext>
+            </a:extLst>
+          </p:cNvPr>
+          <p:cNvSpPr>
+            <a:spLocks noGrp="1"/>
+          </p:cNvSpPr>
+          <p:nvPr>
+            <p:ph type="sldNum" sz="quarter" idx="12"/>
+          </p:nvPr>
+        </p:nvSpPr>
+        <p:spPr>
+          <a:xfrm>
+            <a:off x="8610600" y="6356350"/>
+            <a:ext cx="2743200" cy="365125"/>
+          </a:xfrm>
+        </p:spPr>
+        <p:txBody>
+          <a:bodyPr/>
+          <a:lstStyle/>
+          <a:p>
+            <a:fld id="{312A73BE-F097-4DBB-AEB2-4CC070160BA0}" type="slidenum">
+              <a:rPr lang="de-DE" smtClean="0"/>
+              <a:t>8</a:t>
             </a:fld>
             <a:endParaRPr lang="de-DE"/>
           </a:p>
@@ -9681,7 +12859,7 @@
 </p:sld>
 </file>
 
-<file path=ppt/slides/slide6.xml><?xml version="1.0" encoding="utf-8"?>
+<file path=ppt/slides/slide9.xml><?xml version="1.0" encoding="utf-8"?>
 <p:sld xmlns:a="http://schemas.openxmlformats.org/drawingml/2006/main" xmlns:r="http://schemas.openxmlformats.org/officeDocument/2006/relationships" xmlns:p="http://schemas.openxmlformats.org/presentationml/2006/main">
   <p:cSld>
     <p:spTree>
@@ -9727,16 +12905,6 @@
           <a:lstStyle/>
           <a:p>
             <a:r>
-              <a:rPr lang="de-DE" sz="4400" dirty="0">
-                <a:solidFill>
-                  <a:schemeClr val="tx1">
-                    <a:lumMod val="95000"/>
-                  </a:schemeClr>
-                </a:solidFill>
-              </a:rPr>
-              <a:t>Was kann </a:t>
-            </a:r>
-            <a:r>
               <a:rPr lang="de-DE" sz="4400" dirty="0" err="1">
                 <a:solidFill>
                   <a:schemeClr val="tx1">
@@ -9746,16 +12914,13 @@
               </a:rPr>
               <a:t>strptime</a:t>
             </a:r>
-            <a:r>
-              <a:rPr lang="de-DE" sz="4400" dirty="0">
-                <a:solidFill>
-                  <a:schemeClr val="tx1">
-                    <a:lumMod val="95000"/>
-                  </a:schemeClr>
-                </a:solidFill>
-              </a:rPr>
-              <a:t> ?</a:t>
-            </a:r>
+            <a:endParaRPr lang="de-DE" sz="4400" dirty="0">
+              <a:solidFill>
+                <a:schemeClr val="tx1">
+                  <a:lumMod val="95000"/>
+                </a:schemeClr>
+              </a:solidFill>
+            </a:endParaRPr>
           </a:p>
         </p:txBody>
       </p:sp>
@@ -10173,7 +13338,7 @@
           <a:p>
             <a:fld id="{D4AD37E9-5A10-49A7-855D-CAA2D2E848B6}" type="datetimeFigureOut">
               <a:rPr lang="de-DE" smtClean="0"/>
-              <a:t>29.07.21</a:t>
+              <a:t>18.01.2022</a:t>
             </a:fld>
             <a:endParaRPr lang="de-DE"/>
           </a:p>
@@ -10264,7 +13429,7 @@
           <a:p>
             <a:fld id="{312A73BE-F097-4DBB-AEB2-4CC070160BA0}" type="slidenum">
               <a:rPr lang="de-DE" smtClean="0"/>
-              <a:t>6</a:t>
+              <a:t>9</a:t>
             </a:fld>
             <a:endParaRPr lang="de-DE"/>
           </a:p>

</xml_diff>